<commit_message>
Added lessons 2 and 3 to Basic Programming
</commit_message>
<xml_diff>
--- a/course/1 - Basic Programming/Basic Programming.pptx
+++ b/course/1 - Basic Programming/Basic Programming.pptx
@@ -20,6 +20,21 @@
     <p:sldId id="267" r:id="rId14"/>
     <p:sldId id="268" r:id="rId15"/>
     <p:sldId id="269" r:id="rId16"/>
+    <p:sldId id="272" r:id="rId17"/>
+    <p:sldId id="273" r:id="rId18"/>
+    <p:sldId id="274" r:id="rId19"/>
+    <p:sldId id="275" r:id="rId20"/>
+    <p:sldId id="276" r:id="rId21"/>
+    <p:sldId id="277" r:id="rId22"/>
+    <p:sldId id="278" r:id="rId23"/>
+    <p:sldId id="279" r:id="rId24"/>
+    <p:sldId id="280" r:id="rId25"/>
+    <p:sldId id="281" r:id="rId26"/>
+    <p:sldId id="282" r:id="rId27"/>
+    <p:sldId id="284" r:id="rId28"/>
+    <p:sldId id="285" r:id="rId29"/>
+    <p:sldId id="283" r:id="rId30"/>
+    <p:sldId id="286" r:id="rId31"/>
   </p:sldIdLst>
   <p:sldSz cx="12192000" cy="6858000"/>
   <p:notesSz cx="6858000" cy="9144000"/>
@@ -252,7 +267,7 @@
           <a:p>
             <a:fld id="{C764DE79-268F-4C1A-8933-263129D2AF90}" type="datetimeFigureOut">
               <a:rPr lang="en-US" dirty="0"/>
-              <a:t>3/27/2016</a:t>
+              <a:t>3/29/2016</a:t>
             </a:fld>
             <a:endParaRPr lang="en-US" dirty="0"/>
           </a:p>
@@ -422,7 +437,7 @@
           <a:p>
             <a:fld id="{C764DE79-268F-4C1A-8933-263129D2AF90}" type="datetimeFigureOut">
               <a:rPr lang="en-US" dirty="0"/>
-              <a:t>3/27/2016</a:t>
+              <a:t>3/29/2016</a:t>
             </a:fld>
             <a:endParaRPr lang="en-US" dirty="0"/>
           </a:p>
@@ -602,7 +617,7 @@
           <a:p>
             <a:fld id="{C764DE79-268F-4C1A-8933-263129D2AF90}" type="datetimeFigureOut">
               <a:rPr lang="en-US" dirty="0"/>
-              <a:t>3/27/2016</a:t>
+              <a:t>3/29/2016</a:t>
             </a:fld>
             <a:endParaRPr lang="en-US" dirty="0"/>
           </a:p>
@@ -772,7 +787,7 @@
           <a:p>
             <a:fld id="{C764DE79-268F-4C1A-8933-263129D2AF90}" type="datetimeFigureOut">
               <a:rPr lang="en-US" dirty="0"/>
-              <a:t>3/27/2016</a:t>
+              <a:t>3/29/2016</a:t>
             </a:fld>
             <a:endParaRPr lang="en-US" dirty="0"/>
           </a:p>
@@ -1018,7 +1033,7 @@
           <a:p>
             <a:fld id="{C764DE79-268F-4C1A-8933-263129D2AF90}" type="datetimeFigureOut">
               <a:rPr lang="en-US" dirty="0"/>
-              <a:t>3/27/2016</a:t>
+              <a:t>3/29/2016</a:t>
             </a:fld>
             <a:endParaRPr lang="en-US" dirty="0"/>
           </a:p>
@@ -1250,7 +1265,7 @@
           <a:p>
             <a:fld id="{C764DE79-268F-4C1A-8933-263129D2AF90}" type="datetimeFigureOut">
               <a:rPr lang="en-US" dirty="0"/>
-              <a:t>3/27/2016</a:t>
+              <a:t>3/29/2016</a:t>
             </a:fld>
             <a:endParaRPr lang="en-US" dirty="0"/>
           </a:p>
@@ -1617,7 +1632,7 @@
           <a:p>
             <a:fld id="{C764DE79-268F-4C1A-8933-263129D2AF90}" type="datetimeFigureOut">
               <a:rPr lang="en-US" dirty="0"/>
-              <a:t>3/27/2016</a:t>
+              <a:t>3/29/2016</a:t>
             </a:fld>
             <a:endParaRPr lang="en-US" dirty="0"/>
           </a:p>
@@ -1735,7 +1750,7 @@
           <a:p>
             <a:fld id="{C764DE79-268F-4C1A-8933-263129D2AF90}" type="datetimeFigureOut">
               <a:rPr lang="en-US" dirty="0"/>
-              <a:t>3/27/2016</a:t>
+              <a:t>3/29/2016</a:t>
             </a:fld>
             <a:endParaRPr lang="en-US" dirty="0"/>
           </a:p>
@@ -1830,7 +1845,7 @@
           <a:p>
             <a:fld id="{C764DE79-268F-4C1A-8933-263129D2AF90}" type="datetimeFigureOut">
               <a:rPr lang="en-US" dirty="0"/>
-              <a:t>3/27/2016</a:t>
+              <a:t>3/29/2016</a:t>
             </a:fld>
             <a:endParaRPr lang="en-US" dirty="0"/>
           </a:p>
@@ -2107,7 +2122,7 @@
           <a:p>
             <a:fld id="{C764DE79-268F-4C1A-8933-263129D2AF90}" type="datetimeFigureOut">
               <a:rPr lang="en-US" dirty="0"/>
-              <a:t>3/27/2016</a:t>
+              <a:t>3/29/2016</a:t>
             </a:fld>
             <a:endParaRPr lang="en-US" dirty="0"/>
           </a:p>
@@ -2364,7 +2379,7 @@
           <a:p>
             <a:fld id="{C764DE79-268F-4C1A-8933-263129D2AF90}" type="datetimeFigureOut">
               <a:rPr lang="en-US" dirty="0"/>
-              <a:t>3/27/2016</a:t>
+              <a:t>3/29/2016</a:t>
             </a:fld>
             <a:endParaRPr lang="en-US" dirty="0"/>
           </a:p>
@@ -2577,7 +2592,7 @@
           <a:p>
             <a:fld id="{C764DE79-268F-4C1A-8933-263129D2AF90}" type="datetimeFigureOut">
               <a:rPr lang="en-US" dirty="0"/>
-              <a:t>3/27/2016</a:t>
+              <a:t>3/29/2016</a:t>
             </a:fld>
             <a:endParaRPr lang="en-US" dirty="0"/>
           </a:p>
@@ -3120,8 +3135,12 @@
           <a:lstStyle/>
           <a:p>
             <a:r>
-              <a:rPr lang="en-US" dirty="0"/>
-              <a:t>Interpolation – inserting variables into a string</a:t>
+              <a:rPr lang="en-US" b="1" dirty="0"/>
+              <a:t>Interpolation</a:t>
+            </a:r>
+            <a:r>
+              <a:rPr lang="en-US" dirty="0"/>
+              <a:t> – inserting variables into a string</a:t>
             </a:r>
           </a:p>
           <a:p>
@@ -3138,22 +3157,18 @@
           </a:p>
           <a:p>
             <a:r>
-              <a:rPr lang="en-US" dirty="0"/>
-              <a:t>Escaping – Ignoring a special character in a string</a:t>
-            </a:r>
-          </a:p>
-          <a:p>
-            <a:r>
-              <a:rPr lang="en-US" dirty="0"/>
-              <a:t>Put a \ (backslash) before a quote to make </a:t>
-            </a:r>
-            <a:r>
-              <a:rPr lang="en-US"/>
-              <a:t>PHP</a:t>
-            </a:r>
-            <a:r>
-              <a:rPr lang="en-US" dirty="0"/>
-              <a:t> ignore it</a:t>
+              <a:rPr lang="en-US" b="1" dirty="0"/>
+              <a:t>Escaping</a:t>
+            </a:r>
+            <a:r>
+              <a:rPr lang="en-US" dirty="0"/>
+              <a:t> – Ignoring a special character in a string</a:t>
+            </a:r>
+          </a:p>
+          <a:p>
+            <a:r>
+              <a:rPr lang="en-US" dirty="0"/>
+              <a:t>Put a \ (backslash) before a quote to make PHP ignore it</a:t>
             </a:r>
           </a:p>
         </p:txBody>
@@ -3771,14 +3786,38 @@
           <a:lstStyle/>
           <a:p>
             <a:r>
-              <a:rPr lang="en-US" dirty="0"/>
-              <a:t>Operators operate on data</a:t>
-            </a:r>
-          </a:p>
-          <a:p>
-            <a:r>
-              <a:rPr lang="en-US" dirty="0"/>
-              <a:t>Three types: math, logical, bitwise</a:t>
+              <a:rPr lang="en-US" b="1" dirty="0"/>
+              <a:t>Operators</a:t>
+            </a:r>
+            <a:r>
+              <a:rPr lang="en-US" dirty="0"/>
+              <a:t> operate on data</a:t>
+            </a:r>
+          </a:p>
+          <a:p>
+            <a:r>
+              <a:rPr lang="en-US" dirty="0"/>
+              <a:t>Three types: </a:t>
+            </a:r>
+            <a:r>
+              <a:rPr lang="en-US" b="1" dirty="0"/>
+              <a:t>math</a:t>
+            </a:r>
+            <a:r>
+              <a:rPr lang="en-US" dirty="0"/>
+              <a:t>, </a:t>
+            </a:r>
+            <a:r>
+              <a:rPr lang="en-US" b="1" dirty="0"/>
+              <a:t>logical</a:t>
+            </a:r>
+            <a:r>
+              <a:rPr lang="en-US" dirty="0"/>
+              <a:t>, </a:t>
+            </a:r>
+            <a:r>
+              <a:rPr lang="en-US" b="1" dirty="0"/>
+              <a:t>bitwise</a:t>
             </a:r>
           </a:p>
           <a:p>
@@ -3796,7 +3835,15 @@
           <a:p>
             <a:r>
               <a:rPr lang="en-US" dirty="0"/>
-              <a:t>% is modulus, gives the remainder of division</a:t>
+              <a:t>% is </a:t>
+            </a:r>
+            <a:r>
+              <a:rPr lang="en-US" b="1" dirty="0"/>
+              <a:t>modulus</a:t>
+            </a:r>
+            <a:r>
+              <a:rPr lang="en-US" dirty="0"/>
+              <a:t>, gives the remainder of division</a:t>
             </a:r>
           </a:p>
           <a:p>
@@ -4383,46 +4430,98 @@
           <a:p>
             <a:r>
               <a:rPr lang="en-US" dirty="0"/>
-              <a:t>++ (Increment) adds one the number before it</a:t>
-            </a:r>
-          </a:p>
-          <a:p>
-            <a:r>
-              <a:rPr lang="en-US" dirty="0"/>
-              <a:t>-- (Decrement) subtracts one instead</a:t>
-            </a:r>
-          </a:p>
-          <a:p>
-            <a:r>
-              <a:rPr lang="en-US" dirty="0"/>
-              <a:t>. (Concatenate) connects two strings</a:t>
-            </a:r>
-          </a:p>
-          <a:p>
-            <a:r>
-              <a:rPr lang="en-US" dirty="0"/>
-              <a:t>Logical operators work on Booleans</a:t>
+              <a:t>++ (</a:t>
+            </a:r>
+            <a:r>
+              <a:rPr lang="en-US" b="1" dirty="0"/>
+              <a:t>Increment</a:t>
+            </a:r>
+            <a:r>
+              <a:rPr lang="en-US" dirty="0"/>
+              <a:t>) adds one the number before it</a:t>
+            </a:r>
+          </a:p>
+          <a:p>
+            <a:r>
+              <a:rPr lang="en-US" dirty="0"/>
+              <a:t>-- (</a:t>
+            </a:r>
+            <a:r>
+              <a:rPr lang="en-US" b="1" dirty="0"/>
+              <a:t>Decrement</a:t>
+            </a:r>
+            <a:r>
+              <a:rPr lang="en-US" dirty="0"/>
+              <a:t>) subtracts one instead</a:t>
+            </a:r>
+          </a:p>
+          <a:p>
+            <a:r>
+              <a:rPr lang="en-US" dirty="0"/>
+              <a:t>. (</a:t>
+            </a:r>
+            <a:r>
+              <a:rPr lang="en-US" b="1" dirty="0"/>
+              <a:t>Concatenate</a:t>
+            </a:r>
+            <a:r>
+              <a:rPr lang="en-US" dirty="0"/>
+              <a:t>) connects two strings</a:t>
+            </a:r>
+          </a:p>
+          <a:p>
+            <a:r>
+              <a:rPr lang="en-US" b="1" dirty="0"/>
+              <a:t>Logical operators </a:t>
+            </a:r>
+            <a:r>
+              <a:rPr lang="en-US" dirty="0"/>
+              <a:t>work on Booleans</a:t>
             </a:r>
           </a:p>
           <a:p>
             <a:pPr lvl="1"/>
             <a:r>
               <a:rPr lang="en-US" dirty="0"/>
-              <a:t>&amp;&amp; (and) is true if both inputs are true</a:t>
+              <a:t>&amp;&amp; (</a:t>
+            </a:r>
+            <a:r>
+              <a:rPr lang="en-US" b="1" dirty="0"/>
+              <a:t>and</a:t>
+            </a:r>
+            <a:r>
+              <a:rPr lang="en-US" dirty="0"/>
+              <a:t>) is true if both inputs are true</a:t>
             </a:r>
           </a:p>
           <a:p>
             <a:pPr lvl="1"/>
             <a:r>
               <a:rPr lang="en-US" dirty="0"/>
-              <a:t>|| (or) is true if one or both inputs are true</a:t>
+              <a:t>|| (</a:t>
+            </a:r>
+            <a:r>
+              <a:rPr lang="en-US" b="1" dirty="0"/>
+              <a:t>or</a:t>
+            </a:r>
+            <a:r>
+              <a:rPr lang="en-US" dirty="0"/>
+              <a:t>) is true if one or both inputs are true</a:t>
             </a:r>
           </a:p>
           <a:p>
             <a:pPr lvl="1"/>
             <a:r>
               <a:rPr lang="en-US" dirty="0"/>
-              <a:t>! (not) goes in front of a </a:t>
+              <a:t>! (</a:t>
+            </a:r>
+            <a:r>
+              <a:rPr lang="en-US" b="1" dirty="0"/>
+              <a:t>not</a:t>
+            </a:r>
+            <a:r>
+              <a:rPr lang="en-US" dirty="0"/>
+              <a:t>) goes in front of a </a:t>
             </a:r>
             <a:r>
               <a:rPr lang="en-US" dirty="0" err="1"/>
@@ -5117,6 +5216,881 @@
 </p:sld>
 </file>
 
+<file path=ppt/slides/slide16.xml><?xml version="1.0" encoding="utf-8"?>
+<p:sld xmlns:a="http://schemas.openxmlformats.org/drawingml/2006/main" xmlns:r="http://schemas.openxmlformats.org/officeDocument/2006/relationships" xmlns:p="http://schemas.openxmlformats.org/presentationml/2006/main">
+  <p:cSld>
+    <p:spTree>
+      <p:nvGrpSpPr>
+        <p:cNvPr id="1" name=""/>
+        <p:cNvGrpSpPr/>
+        <p:nvPr/>
+      </p:nvGrpSpPr>
+      <p:grpSpPr>
+        <a:xfrm>
+          <a:off x="0" y="0"/>
+          <a:ext cx="0" cy="0"/>
+          <a:chOff x="0" y="0"/>
+          <a:chExt cx="0" cy="0"/>
+        </a:xfrm>
+      </p:grpSpPr>
+      <p:sp>
+        <p:nvSpPr>
+          <p:cNvPr id="2" name="Title 1"/>
+          <p:cNvSpPr>
+            <a:spLocks noGrp="1"/>
+          </p:cNvSpPr>
+          <p:nvPr>
+            <p:ph type="title"/>
+          </p:nvPr>
+        </p:nvSpPr>
+        <p:spPr>
+          <a:xfrm>
+            <a:off x="831850" y="3622902"/>
+            <a:ext cx="10515600" cy="939573"/>
+          </a:xfrm>
+        </p:spPr>
+        <p:txBody>
+          <a:bodyPr/>
+          <a:lstStyle/>
+          <a:p>
+            <a:r>
+              <a:rPr lang="en-US" dirty="0"/>
+              <a:t>Functions</a:t>
+            </a:r>
+          </a:p>
+        </p:txBody>
+      </p:sp>
+      <p:sp>
+        <p:nvSpPr>
+          <p:cNvPr id="3" name="Content Placeholder 2"/>
+          <p:cNvSpPr>
+            <a:spLocks noGrp="1"/>
+          </p:cNvSpPr>
+          <p:nvPr>
+            <p:ph type="body" idx="1"/>
+          </p:nvPr>
+        </p:nvSpPr>
+        <p:spPr>
+          <a:xfrm>
+            <a:off x="831850" y="3143704"/>
+            <a:ext cx="10515600" cy="479198"/>
+          </a:xfrm>
+        </p:spPr>
+        <p:txBody>
+          <a:bodyPr anchor="b"/>
+          <a:lstStyle/>
+          <a:p>
+            <a:r>
+              <a:rPr lang="en-US" dirty="0"/>
+              <a:t>Lesson 2</a:t>
+            </a:r>
+          </a:p>
+        </p:txBody>
+      </p:sp>
+    </p:spTree>
+    <p:extLst>
+      <p:ext uri="{BB962C8B-B14F-4D97-AF65-F5344CB8AC3E}">
+        <p14:creationId xmlns:p14="http://schemas.microsoft.com/office/powerpoint/2010/main" val="2393728014"/>
+      </p:ext>
+    </p:extLst>
+  </p:cSld>
+  <p:clrMapOvr>
+    <a:masterClrMapping/>
+  </p:clrMapOvr>
+</p:sld>
+</file>
+
+<file path=ppt/slides/slide17.xml><?xml version="1.0" encoding="utf-8"?>
+<p:sld xmlns:a="http://schemas.openxmlformats.org/drawingml/2006/main" xmlns:r="http://schemas.openxmlformats.org/officeDocument/2006/relationships" xmlns:p="http://schemas.openxmlformats.org/presentationml/2006/main">
+  <p:cSld>
+    <p:spTree>
+      <p:nvGrpSpPr>
+        <p:cNvPr id="1" name=""/>
+        <p:cNvGrpSpPr/>
+        <p:nvPr/>
+      </p:nvGrpSpPr>
+      <p:grpSpPr>
+        <a:xfrm>
+          <a:off x="0" y="0"/>
+          <a:ext cx="0" cy="0"/>
+          <a:chOff x="0" y="0"/>
+          <a:chExt cx="0" cy="0"/>
+        </a:xfrm>
+      </p:grpSpPr>
+      <p:sp>
+        <p:nvSpPr>
+          <p:cNvPr id="2" name="Title 1"/>
+          <p:cNvSpPr>
+            <a:spLocks noGrp="1"/>
+          </p:cNvSpPr>
+          <p:nvPr>
+            <p:ph type="title"/>
+          </p:nvPr>
+        </p:nvSpPr>
+        <p:spPr/>
+        <p:txBody>
+          <a:bodyPr/>
+          <a:lstStyle/>
+          <a:p>
+            <a:r>
+              <a:rPr lang="en-US" dirty="0"/>
+              <a:t>What is </a:t>
+            </a:r>
+            <a:r>
+              <a:rPr lang="en-US"/>
+              <a:t>a function?</a:t>
+            </a:r>
+          </a:p>
+        </p:txBody>
+      </p:sp>
+      <p:sp>
+        <p:nvSpPr>
+          <p:cNvPr id="3" name="Text Placeholder 2"/>
+          <p:cNvSpPr>
+            <a:spLocks noGrp="1"/>
+          </p:cNvSpPr>
+          <p:nvPr>
+            <p:ph idx="1"/>
+          </p:nvPr>
+        </p:nvSpPr>
+        <p:spPr/>
+        <p:txBody>
+          <a:bodyPr/>
+          <a:lstStyle/>
+          <a:p>
+            <a:r>
+              <a:rPr lang="en-US" b="1" dirty="0"/>
+              <a:t>Function</a:t>
+            </a:r>
+            <a:r>
+              <a:rPr lang="en-US" dirty="0"/>
+              <a:t> – A named block of code that can be reused</a:t>
+            </a:r>
+          </a:p>
+          <a:p>
+            <a:r>
+              <a:rPr lang="en-US" dirty="0"/>
+              <a:t>Function names work like variable names, but no $</a:t>
+            </a:r>
+          </a:p>
+          <a:p>
+            <a:r>
+              <a:rPr lang="en-US" dirty="0"/>
+              <a:t>Functions are </a:t>
+            </a:r>
+            <a:r>
+              <a:rPr lang="en-US" b="1" dirty="0"/>
+              <a:t>called</a:t>
+            </a:r>
+            <a:r>
+              <a:rPr lang="en-US" dirty="0"/>
+              <a:t> (run) using parentheses</a:t>
+            </a:r>
+          </a:p>
+          <a:p>
+            <a:r>
+              <a:rPr lang="en-US" b="1" dirty="0"/>
+              <a:t>Arguments</a:t>
+            </a:r>
+            <a:r>
+              <a:rPr lang="en-US" dirty="0"/>
+              <a:t> (data used by the function) go inside the parentheses</a:t>
+            </a:r>
+          </a:p>
+          <a:p>
+            <a:r>
+              <a:rPr lang="en-US" dirty="0"/>
+              <a:t>Data comes out of the function via a </a:t>
+            </a:r>
+            <a:r>
+              <a:rPr lang="en-US" b="1" dirty="0"/>
+              <a:t>return value</a:t>
+            </a:r>
+          </a:p>
+          <a:p>
+            <a:r>
+              <a:rPr lang="en-US" dirty="0"/>
+              <a:t>Return values can be used like any other piece of data</a:t>
+            </a:r>
+          </a:p>
+          <a:p>
+            <a:pPr lvl="1"/>
+            <a:r>
+              <a:rPr lang="en-US" dirty="0"/>
+              <a:t>Put it in a variable, use an operator on it, use it as a function argument, etc.</a:t>
+            </a:r>
+          </a:p>
+        </p:txBody>
+      </p:sp>
+    </p:spTree>
+    <p:extLst>
+      <p:ext uri="{BB962C8B-B14F-4D97-AF65-F5344CB8AC3E}">
+        <p14:creationId xmlns:p14="http://schemas.microsoft.com/office/powerpoint/2010/main" val="3980354190"/>
+      </p:ext>
+    </p:extLst>
+  </p:cSld>
+  <p:clrMapOvr>
+    <a:masterClrMapping/>
+  </p:clrMapOvr>
+</p:sld>
+</file>
+
+<file path=ppt/slides/slide18.xml><?xml version="1.0" encoding="utf-8"?>
+<p:sld xmlns:a="http://schemas.openxmlformats.org/drawingml/2006/main" xmlns:r="http://schemas.openxmlformats.org/officeDocument/2006/relationships" xmlns:p="http://schemas.openxmlformats.org/presentationml/2006/main">
+  <p:cSld>
+    <p:spTree>
+      <p:nvGrpSpPr>
+        <p:cNvPr id="1" name=""/>
+        <p:cNvGrpSpPr/>
+        <p:nvPr/>
+      </p:nvGrpSpPr>
+      <p:grpSpPr>
+        <a:xfrm>
+          <a:off x="0" y="0"/>
+          <a:ext cx="0" cy="0"/>
+          <a:chOff x="0" y="0"/>
+          <a:chExt cx="0" cy="0"/>
+        </a:xfrm>
+      </p:grpSpPr>
+      <p:sp>
+        <p:nvSpPr>
+          <p:cNvPr id="5" name="TextBox 4"/>
+          <p:cNvSpPr txBox="1"/>
+          <p:nvPr/>
+        </p:nvSpPr>
+        <p:spPr>
+          <a:xfrm>
+            <a:off x="0" y="583973"/>
+            <a:ext cx="935489" cy="6370975"/>
+          </a:xfrm>
+          <a:prstGeom prst="rect">
+            <a:avLst/>
+          </a:prstGeom>
+          <a:solidFill>
+            <a:schemeClr val="bg1">
+              <a:lumMod val="85000"/>
+            </a:schemeClr>
+          </a:solidFill>
+        </p:spPr>
+        <p:txBody>
+          <a:bodyPr wrap="square" rtlCol="0" anchor="ctr">
+            <a:spAutoFit/>
+          </a:bodyPr>
+          <a:lstStyle/>
+          <a:p>
+            <a:pPr algn="r"/>
+            <a:r>
+              <a:rPr lang="en-US" sz="2400" dirty="0">
+                <a:solidFill>
+                  <a:schemeClr val="accent3">
+                    <a:lumMod val="50000"/>
+                  </a:schemeClr>
+                </a:solidFill>
+                <a:latin typeface="Consolas" panose="020B0609020204030204" pitchFamily="49" charset="0"/>
+              </a:rPr>
+              <a:t>1</a:t>
+            </a:r>
+          </a:p>
+          <a:p>
+            <a:pPr algn="r"/>
+            <a:r>
+              <a:rPr lang="en-US" sz="2400" dirty="0">
+                <a:solidFill>
+                  <a:schemeClr val="accent3">
+                    <a:lumMod val="50000"/>
+                  </a:schemeClr>
+                </a:solidFill>
+                <a:latin typeface="Consolas" panose="020B0609020204030204" pitchFamily="49" charset="0"/>
+              </a:rPr>
+              <a:t>2</a:t>
+            </a:r>
+          </a:p>
+          <a:p>
+            <a:pPr algn="r"/>
+            <a:r>
+              <a:rPr lang="en-US" sz="2400" dirty="0">
+                <a:solidFill>
+                  <a:schemeClr val="accent3">
+                    <a:lumMod val="50000"/>
+                  </a:schemeClr>
+                </a:solidFill>
+                <a:latin typeface="Consolas" panose="020B0609020204030204" pitchFamily="49" charset="0"/>
+              </a:rPr>
+              <a:t>3</a:t>
+            </a:r>
+          </a:p>
+          <a:p>
+            <a:pPr algn="r"/>
+            <a:r>
+              <a:rPr lang="en-US" sz="2400" dirty="0">
+                <a:solidFill>
+                  <a:schemeClr val="accent3">
+                    <a:lumMod val="50000"/>
+                  </a:schemeClr>
+                </a:solidFill>
+                <a:latin typeface="Consolas" panose="020B0609020204030204" pitchFamily="49" charset="0"/>
+              </a:rPr>
+              <a:t>4</a:t>
+            </a:r>
+          </a:p>
+          <a:p>
+            <a:pPr algn="r"/>
+            <a:r>
+              <a:rPr lang="en-US" sz="2400" dirty="0">
+                <a:solidFill>
+                  <a:schemeClr val="accent3">
+                    <a:lumMod val="50000"/>
+                  </a:schemeClr>
+                </a:solidFill>
+                <a:latin typeface="Consolas" panose="020B0609020204030204" pitchFamily="49" charset="0"/>
+              </a:rPr>
+              <a:t>5</a:t>
+            </a:r>
+          </a:p>
+          <a:p>
+            <a:pPr algn="r"/>
+            <a:r>
+              <a:rPr lang="en-US" sz="2400" dirty="0">
+                <a:solidFill>
+                  <a:schemeClr val="accent3">
+                    <a:lumMod val="50000"/>
+                  </a:schemeClr>
+                </a:solidFill>
+                <a:latin typeface="Consolas" panose="020B0609020204030204" pitchFamily="49" charset="0"/>
+              </a:rPr>
+              <a:t>6</a:t>
+            </a:r>
+          </a:p>
+          <a:p>
+            <a:pPr algn="r"/>
+            <a:r>
+              <a:rPr lang="en-US" sz="2400" dirty="0">
+                <a:solidFill>
+                  <a:schemeClr val="accent3">
+                    <a:lumMod val="50000"/>
+                  </a:schemeClr>
+                </a:solidFill>
+                <a:latin typeface="Consolas" panose="020B0609020204030204" pitchFamily="49" charset="0"/>
+              </a:rPr>
+              <a:t>7</a:t>
+            </a:r>
+          </a:p>
+          <a:p>
+            <a:pPr algn="r"/>
+            <a:r>
+              <a:rPr lang="en-US" sz="2400" dirty="0">
+                <a:solidFill>
+                  <a:schemeClr val="accent3">
+                    <a:lumMod val="50000"/>
+                  </a:schemeClr>
+                </a:solidFill>
+                <a:latin typeface="Consolas" panose="020B0609020204030204" pitchFamily="49" charset="0"/>
+              </a:rPr>
+              <a:t>8</a:t>
+            </a:r>
+          </a:p>
+          <a:p>
+            <a:pPr algn="r"/>
+            <a:r>
+              <a:rPr lang="en-US" sz="2400" dirty="0">
+                <a:solidFill>
+                  <a:schemeClr val="accent3">
+                    <a:lumMod val="50000"/>
+                  </a:schemeClr>
+                </a:solidFill>
+                <a:latin typeface="Consolas" panose="020B0609020204030204" pitchFamily="49" charset="0"/>
+              </a:rPr>
+              <a:t>9</a:t>
+            </a:r>
+          </a:p>
+          <a:p>
+            <a:pPr algn="r"/>
+            <a:r>
+              <a:rPr lang="en-US" sz="2400" dirty="0">
+                <a:solidFill>
+                  <a:schemeClr val="accent3">
+                    <a:lumMod val="50000"/>
+                  </a:schemeClr>
+                </a:solidFill>
+                <a:latin typeface="Consolas" panose="020B0609020204030204" pitchFamily="49" charset="0"/>
+              </a:rPr>
+              <a:t>10</a:t>
+            </a:r>
+          </a:p>
+          <a:p>
+            <a:pPr algn="r"/>
+            <a:r>
+              <a:rPr lang="en-US" sz="2400" dirty="0">
+                <a:solidFill>
+                  <a:schemeClr val="accent3">
+                    <a:lumMod val="50000"/>
+                  </a:schemeClr>
+                </a:solidFill>
+                <a:latin typeface="Consolas" panose="020B0609020204030204" pitchFamily="49" charset="0"/>
+              </a:rPr>
+              <a:t>11</a:t>
+            </a:r>
+          </a:p>
+          <a:p>
+            <a:pPr algn="r"/>
+            <a:r>
+              <a:rPr lang="en-US" sz="2400" dirty="0">
+                <a:solidFill>
+                  <a:schemeClr val="accent3">
+                    <a:lumMod val="50000"/>
+                  </a:schemeClr>
+                </a:solidFill>
+                <a:latin typeface="Consolas" panose="020B0609020204030204" pitchFamily="49" charset="0"/>
+              </a:rPr>
+              <a:t>12</a:t>
+            </a:r>
+          </a:p>
+          <a:p>
+            <a:pPr algn="r"/>
+            <a:r>
+              <a:rPr lang="en-US" sz="2400" dirty="0">
+                <a:solidFill>
+                  <a:schemeClr val="accent3">
+                    <a:lumMod val="50000"/>
+                  </a:schemeClr>
+                </a:solidFill>
+                <a:latin typeface="Consolas" panose="020B0609020204030204" pitchFamily="49" charset="0"/>
+              </a:rPr>
+              <a:t>13</a:t>
+            </a:r>
+          </a:p>
+          <a:p>
+            <a:pPr algn="r"/>
+            <a:r>
+              <a:rPr lang="en-US" sz="2400" dirty="0">
+                <a:solidFill>
+                  <a:schemeClr val="accent3">
+                    <a:lumMod val="50000"/>
+                  </a:schemeClr>
+                </a:solidFill>
+                <a:latin typeface="Consolas" panose="020B0609020204030204" pitchFamily="49" charset="0"/>
+              </a:rPr>
+              <a:t>14</a:t>
+            </a:r>
+          </a:p>
+          <a:p>
+            <a:pPr algn="r"/>
+            <a:r>
+              <a:rPr lang="en-US" sz="2400" dirty="0">
+                <a:solidFill>
+                  <a:schemeClr val="accent3">
+                    <a:lumMod val="50000"/>
+                  </a:schemeClr>
+                </a:solidFill>
+                <a:latin typeface="Consolas" panose="020B0609020204030204" pitchFamily="49" charset="0"/>
+              </a:rPr>
+              <a:t>15</a:t>
+            </a:r>
+          </a:p>
+          <a:p>
+            <a:pPr algn="r"/>
+            <a:r>
+              <a:rPr lang="en-US" sz="2400" dirty="0">
+                <a:solidFill>
+                  <a:schemeClr val="accent3">
+                    <a:lumMod val="50000"/>
+                  </a:schemeClr>
+                </a:solidFill>
+                <a:latin typeface="Consolas" panose="020B0609020204030204" pitchFamily="49" charset="0"/>
+              </a:rPr>
+              <a:t>16</a:t>
+            </a:r>
+          </a:p>
+          <a:p>
+            <a:pPr algn="r"/>
+            <a:endParaRPr lang="en-US" sz="2400" dirty="0">
+              <a:latin typeface="Consolas" panose="020B0609020204030204" pitchFamily="49" charset="0"/>
+            </a:endParaRPr>
+          </a:p>
+        </p:txBody>
+      </p:sp>
+      <p:sp>
+        <p:nvSpPr>
+          <p:cNvPr id="6" name="TextBox 5"/>
+          <p:cNvSpPr txBox="1"/>
+          <p:nvPr/>
+        </p:nvSpPr>
+        <p:spPr>
+          <a:xfrm>
+            <a:off x="935490" y="583973"/>
+            <a:ext cx="11256511" cy="3046988"/>
+          </a:xfrm>
+          <a:prstGeom prst="rect">
+            <a:avLst/>
+          </a:prstGeom>
+          <a:noFill/>
+        </p:spPr>
+        <p:txBody>
+          <a:bodyPr wrap="square" rtlCol="0">
+            <a:spAutoFit/>
+          </a:bodyPr>
+          <a:lstStyle/>
+          <a:p>
+            <a:pPr marL="0" indent="0">
+              <a:buNone/>
+            </a:pPr>
+            <a:r>
+              <a:rPr lang="en-US" sz="2400" dirty="0">
+                <a:solidFill>
+                  <a:srgbClr val="7030A0"/>
+                </a:solidFill>
+                <a:latin typeface="Consolas" panose="020B0609020204030204" pitchFamily="49" charset="0"/>
+              </a:rPr>
+              <a:t>&lt;?php</a:t>
+            </a:r>
+            <a:endParaRPr lang="en-US" sz="2400" dirty="0">
+              <a:latin typeface="Consolas" panose="020B0609020204030204" pitchFamily="49" charset="0"/>
+            </a:endParaRPr>
+          </a:p>
+          <a:p>
+            <a:pPr marL="0" indent="0">
+              <a:buNone/>
+            </a:pPr>
+            <a:endParaRPr lang="en-US" sz="2400" dirty="0">
+              <a:latin typeface="Consolas" panose="020B0609020204030204" pitchFamily="49" charset="0"/>
+            </a:endParaRPr>
+          </a:p>
+          <a:p>
+            <a:r>
+              <a:rPr lang="en-US" sz="2400" dirty="0" err="1">
+                <a:latin typeface="Consolas" panose="020B0609020204030204" pitchFamily="49" charset="0"/>
+              </a:rPr>
+              <a:t>var_dump</a:t>
+            </a:r>
+            <a:r>
+              <a:rPr lang="en-US" sz="2400" dirty="0">
+                <a:latin typeface="Consolas" panose="020B0609020204030204" pitchFamily="49" charset="0"/>
+              </a:rPr>
+              <a:t>(</a:t>
+            </a:r>
+            <a:r>
+              <a:rPr lang="en-US" sz="2400" dirty="0">
+                <a:solidFill>
+                  <a:schemeClr val="accent2"/>
+                </a:solidFill>
+                <a:latin typeface="Consolas" panose="020B0609020204030204" pitchFamily="49" charset="0"/>
+              </a:rPr>
+              <a:t>"I'm using a function!"</a:t>
+            </a:r>
+            <a:r>
+              <a:rPr lang="en-US" sz="2400" dirty="0">
+                <a:latin typeface="Consolas" panose="020B0609020204030204" pitchFamily="49" charset="0"/>
+              </a:rPr>
+              <a:t>);</a:t>
+            </a:r>
+          </a:p>
+          <a:p>
+            <a:pPr marL="0" indent="0">
+              <a:buNone/>
+            </a:pPr>
+            <a:endParaRPr lang="en-US" sz="2400" dirty="0">
+              <a:latin typeface="Consolas" panose="020B0609020204030204" pitchFamily="49" charset="0"/>
+            </a:endParaRPr>
+          </a:p>
+          <a:p>
+            <a:pPr marL="0" indent="0">
+              <a:buNone/>
+            </a:pPr>
+            <a:r>
+              <a:rPr lang="en-US" sz="2400" dirty="0">
+                <a:latin typeface="Consolas" panose="020B0609020204030204" pitchFamily="49" charset="0"/>
+              </a:rPr>
+              <a:t>$sine = sin(</a:t>
+            </a:r>
+            <a:r>
+              <a:rPr lang="en-US" sz="2400" dirty="0">
+                <a:solidFill>
+                  <a:srgbClr val="C00000"/>
+                </a:solidFill>
+                <a:latin typeface="Consolas" panose="020B0609020204030204" pitchFamily="49" charset="0"/>
+              </a:rPr>
+              <a:t>2</a:t>
+            </a:r>
+            <a:r>
+              <a:rPr lang="en-US" sz="2400" dirty="0">
+                <a:latin typeface="Consolas" panose="020B0609020204030204" pitchFamily="49" charset="0"/>
+              </a:rPr>
+              <a:t>);</a:t>
+            </a:r>
+          </a:p>
+          <a:p>
+            <a:pPr marL="0" indent="0">
+              <a:buNone/>
+            </a:pPr>
+            <a:r>
+              <a:rPr lang="en-US" sz="2400" dirty="0">
+                <a:solidFill>
+                  <a:srgbClr val="0070C0"/>
+                </a:solidFill>
+                <a:latin typeface="Consolas" panose="020B0609020204030204" pitchFamily="49" charset="0"/>
+              </a:rPr>
+              <a:t>echo</a:t>
+            </a:r>
+            <a:r>
+              <a:rPr lang="en-US" sz="2400" dirty="0">
+                <a:latin typeface="Consolas" panose="020B0609020204030204" pitchFamily="49" charset="0"/>
+              </a:rPr>
+              <a:t> $sine;</a:t>
+            </a:r>
+          </a:p>
+          <a:p>
+            <a:pPr marL="0" indent="0">
+              <a:buNone/>
+            </a:pPr>
+            <a:endParaRPr lang="en-US" sz="2400" dirty="0">
+              <a:latin typeface="Consolas" panose="020B0609020204030204" pitchFamily="49" charset="0"/>
+            </a:endParaRPr>
+          </a:p>
+          <a:p>
+            <a:pPr marL="0" indent="0">
+              <a:buNone/>
+            </a:pPr>
+            <a:r>
+              <a:rPr lang="en-US" sz="2400" dirty="0">
+                <a:solidFill>
+                  <a:srgbClr val="0070C0"/>
+                </a:solidFill>
+                <a:latin typeface="Consolas" panose="020B0609020204030204" pitchFamily="49" charset="0"/>
+              </a:rPr>
+              <a:t>echo</a:t>
+            </a:r>
+            <a:r>
+              <a:rPr lang="en-US" sz="2400" dirty="0">
+                <a:latin typeface="Consolas" panose="020B0609020204030204" pitchFamily="49" charset="0"/>
+              </a:rPr>
+              <a:t> sin(cos(</a:t>
+            </a:r>
+            <a:r>
+              <a:rPr lang="en-US" sz="2400" dirty="0">
+                <a:solidFill>
+                  <a:srgbClr val="C00000"/>
+                </a:solidFill>
+                <a:latin typeface="Consolas" panose="020B0609020204030204" pitchFamily="49" charset="0"/>
+              </a:rPr>
+              <a:t>1.5</a:t>
+            </a:r>
+            <a:r>
+              <a:rPr lang="en-US" sz="2400" dirty="0">
+                <a:latin typeface="Consolas" panose="020B0609020204030204" pitchFamily="49" charset="0"/>
+              </a:rPr>
+              <a:t>) + </a:t>
+            </a:r>
+            <a:r>
+              <a:rPr lang="en-US" sz="2400" dirty="0">
+                <a:solidFill>
+                  <a:srgbClr val="C00000"/>
+                </a:solidFill>
+                <a:latin typeface="Consolas" panose="020B0609020204030204" pitchFamily="49" charset="0"/>
+              </a:rPr>
+              <a:t>1</a:t>
+            </a:r>
+            <a:r>
+              <a:rPr lang="en-US" sz="2400" dirty="0">
+                <a:latin typeface="Consolas" panose="020B0609020204030204" pitchFamily="49" charset="0"/>
+              </a:rPr>
+              <a:t>);</a:t>
+            </a:r>
+          </a:p>
+        </p:txBody>
+      </p:sp>
+      <p:sp>
+        <p:nvSpPr>
+          <p:cNvPr id="2" name="Title 1"/>
+          <p:cNvSpPr>
+            <a:spLocks noGrp="1"/>
+          </p:cNvSpPr>
+          <p:nvPr>
+            <p:ph type="title"/>
+          </p:nvPr>
+        </p:nvSpPr>
+        <p:spPr>
+          <a:xfrm>
+            <a:off x="1" y="0"/>
+            <a:ext cx="12192000" cy="583973"/>
+          </a:xfrm>
+          <a:solidFill>
+            <a:schemeClr val="bg1">
+              <a:lumMod val="50000"/>
+            </a:schemeClr>
+          </a:solidFill>
+          <a:ln>
+            <a:noFill/>
+          </a:ln>
+        </p:spPr>
+        <p:style>
+          <a:lnRef idx="2">
+            <a:schemeClr val="accent3">
+              <a:shade val="50000"/>
+            </a:schemeClr>
+          </a:lnRef>
+          <a:fillRef idx="1">
+            <a:schemeClr val="accent3"/>
+          </a:fillRef>
+          <a:effectRef idx="0">
+            <a:schemeClr val="accent3"/>
+          </a:effectRef>
+          <a:fontRef idx="minor">
+            <a:schemeClr val="lt1"/>
+          </a:fontRef>
+        </p:style>
+        <p:txBody>
+          <a:bodyPr>
+            <a:normAutofit fontScale="90000"/>
+          </a:bodyPr>
+          <a:lstStyle/>
+          <a:p>
+            <a:pPr algn="ctr"/>
+            <a:r>
+              <a:rPr lang="en-US" sz="3600" dirty="0"/>
+              <a:t>Example 2-1 : Using Functions</a:t>
+            </a:r>
+          </a:p>
+        </p:txBody>
+      </p:sp>
+    </p:spTree>
+    <p:extLst>
+      <p:ext uri="{BB962C8B-B14F-4D97-AF65-F5344CB8AC3E}">
+        <p14:creationId xmlns:p14="http://schemas.microsoft.com/office/powerpoint/2010/main" val="2623913557"/>
+      </p:ext>
+    </p:extLst>
+  </p:cSld>
+  <p:clrMapOvr>
+    <a:masterClrMapping/>
+  </p:clrMapOvr>
+</p:sld>
+</file>
+
+<file path=ppt/slides/slide19.xml><?xml version="1.0" encoding="utf-8"?>
+<p:sld xmlns:a="http://schemas.openxmlformats.org/drawingml/2006/main" xmlns:r="http://schemas.openxmlformats.org/officeDocument/2006/relationships" xmlns:p="http://schemas.openxmlformats.org/presentationml/2006/main">
+  <p:cSld>
+    <p:spTree>
+      <p:nvGrpSpPr>
+        <p:cNvPr id="1" name=""/>
+        <p:cNvGrpSpPr/>
+        <p:nvPr/>
+      </p:nvGrpSpPr>
+      <p:grpSpPr>
+        <a:xfrm>
+          <a:off x="0" y="0"/>
+          <a:ext cx="0" cy="0"/>
+          <a:chOff x="0" y="0"/>
+          <a:chExt cx="0" cy="0"/>
+        </a:xfrm>
+      </p:grpSpPr>
+      <p:sp>
+        <p:nvSpPr>
+          <p:cNvPr id="2" name="Title 1"/>
+          <p:cNvSpPr>
+            <a:spLocks noGrp="1"/>
+          </p:cNvSpPr>
+          <p:nvPr>
+            <p:ph type="title"/>
+          </p:nvPr>
+        </p:nvSpPr>
+        <p:spPr/>
+        <p:txBody>
+          <a:bodyPr/>
+          <a:lstStyle/>
+          <a:p>
+            <a:r>
+              <a:rPr lang="en-US" dirty="0"/>
+              <a:t>Declaring a function</a:t>
+            </a:r>
+          </a:p>
+        </p:txBody>
+      </p:sp>
+      <p:sp>
+        <p:nvSpPr>
+          <p:cNvPr id="3" name="Content Placeholder 2"/>
+          <p:cNvSpPr>
+            <a:spLocks noGrp="1"/>
+          </p:cNvSpPr>
+          <p:nvPr>
+            <p:ph idx="1"/>
+          </p:nvPr>
+        </p:nvSpPr>
+        <p:spPr/>
+        <p:txBody>
+          <a:bodyPr/>
+          <a:lstStyle/>
+          <a:p>
+            <a:r>
+              <a:rPr lang="en-US" dirty="0"/>
+              <a:t>Functions are created, or </a:t>
+            </a:r>
+            <a:r>
+              <a:rPr lang="en-US" b="1" dirty="0"/>
+              <a:t>declared</a:t>
+            </a:r>
+            <a:r>
+              <a:rPr lang="en-US" dirty="0"/>
+              <a:t>, with the </a:t>
+            </a:r>
+            <a:r>
+              <a:rPr lang="en-US" sz="2400" dirty="0">
+                <a:solidFill>
+                  <a:srgbClr val="0070C0"/>
+                </a:solidFill>
+                <a:latin typeface="Consolas" panose="020B0609020204030204" pitchFamily="49" charset="0"/>
+              </a:rPr>
+              <a:t>function</a:t>
+            </a:r>
+            <a:r>
+              <a:rPr lang="en-US" dirty="0"/>
+              <a:t> keyword</a:t>
+            </a:r>
+          </a:p>
+          <a:p>
+            <a:r>
+              <a:rPr lang="en-US" dirty="0"/>
+              <a:t>Code for the function is contained in braces </a:t>
+            </a:r>
+            <a:r>
+              <a:rPr lang="en-US" sz="2400" dirty="0">
+                <a:latin typeface="Consolas" panose="020B0609020204030204" pitchFamily="49" charset="0"/>
+              </a:rPr>
+              <a:t>{}</a:t>
+            </a:r>
+          </a:p>
+          <a:p>
+            <a:r>
+              <a:rPr lang="en-US" dirty="0"/>
+              <a:t>Function declarations can go (almost) anywhere</a:t>
+            </a:r>
+          </a:p>
+          <a:p>
+            <a:pPr lvl="1"/>
+            <a:r>
+              <a:rPr lang="en-US" dirty="0"/>
+              <a:t>Don’t put them inside anything or you will probably break things</a:t>
+            </a:r>
+          </a:p>
+          <a:p>
+            <a:r>
+              <a:rPr lang="en-US" dirty="0"/>
+              <a:t>Any code can go inside a function</a:t>
+            </a:r>
+          </a:p>
+        </p:txBody>
+      </p:sp>
+    </p:spTree>
+    <p:extLst>
+      <p:ext uri="{BB962C8B-B14F-4D97-AF65-F5344CB8AC3E}">
+        <p14:creationId xmlns:p14="http://schemas.microsoft.com/office/powerpoint/2010/main" val="1320041415"/>
+      </p:ext>
+    </p:extLst>
+  </p:cSld>
+  <p:clrMapOvr>
+    <a:masterClrMapping/>
+  </p:clrMapOvr>
+</p:sld>
+</file>
+
 <file path=ppt/slides/slide2.xml><?xml version="1.0" encoding="utf-8"?>
 <p:sld xmlns:a="http://schemas.openxmlformats.org/drawingml/2006/main" xmlns:r="http://schemas.openxmlformats.org/officeDocument/2006/relationships" xmlns:p="http://schemas.openxmlformats.org/presentationml/2006/main">
   <p:cSld>
@@ -5160,6 +6134,2863 @@
     <p:extLst>
       <p:ext uri="{BB962C8B-B14F-4D97-AF65-F5344CB8AC3E}">
         <p14:creationId xmlns:p14="http://schemas.microsoft.com/office/powerpoint/2010/main" val="1928176109"/>
+      </p:ext>
+    </p:extLst>
+  </p:cSld>
+  <p:clrMapOvr>
+    <a:masterClrMapping/>
+  </p:clrMapOvr>
+</p:sld>
+</file>
+
+<file path=ppt/slides/slide20.xml><?xml version="1.0" encoding="utf-8"?>
+<p:sld xmlns:a="http://schemas.openxmlformats.org/drawingml/2006/main" xmlns:r="http://schemas.openxmlformats.org/officeDocument/2006/relationships" xmlns:p="http://schemas.openxmlformats.org/presentationml/2006/main">
+  <p:cSld>
+    <p:spTree>
+      <p:nvGrpSpPr>
+        <p:cNvPr id="1" name=""/>
+        <p:cNvGrpSpPr/>
+        <p:nvPr/>
+      </p:nvGrpSpPr>
+      <p:grpSpPr>
+        <a:xfrm>
+          <a:off x="0" y="0"/>
+          <a:ext cx="0" cy="0"/>
+          <a:chOff x="0" y="0"/>
+          <a:chExt cx="0" cy="0"/>
+        </a:xfrm>
+      </p:grpSpPr>
+      <p:sp>
+        <p:nvSpPr>
+          <p:cNvPr id="5" name="TextBox 4"/>
+          <p:cNvSpPr txBox="1"/>
+          <p:nvPr/>
+        </p:nvSpPr>
+        <p:spPr>
+          <a:xfrm>
+            <a:off x="0" y="583973"/>
+            <a:ext cx="935489" cy="6370975"/>
+          </a:xfrm>
+          <a:prstGeom prst="rect">
+            <a:avLst/>
+          </a:prstGeom>
+          <a:solidFill>
+            <a:schemeClr val="bg1">
+              <a:lumMod val="85000"/>
+            </a:schemeClr>
+          </a:solidFill>
+        </p:spPr>
+        <p:txBody>
+          <a:bodyPr wrap="square" rtlCol="0" anchor="ctr">
+            <a:spAutoFit/>
+          </a:bodyPr>
+          <a:lstStyle/>
+          <a:p>
+            <a:pPr algn="r"/>
+            <a:r>
+              <a:rPr lang="en-US" sz="2400" dirty="0">
+                <a:solidFill>
+                  <a:schemeClr val="accent3">
+                    <a:lumMod val="50000"/>
+                  </a:schemeClr>
+                </a:solidFill>
+                <a:latin typeface="Consolas" panose="020B0609020204030204" pitchFamily="49" charset="0"/>
+              </a:rPr>
+              <a:t>1</a:t>
+            </a:r>
+          </a:p>
+          <a:p>
+            <a:pPr algn="r"/>
+            <a:r>
+              <a:rPr lang="en-US" sz="2400" dirty="0">
+                <a:solidFill>
+                  <a:schemeClr val="accent3">
+                    <a:lumMod val="50000"/>
+                  </a:schemeClr>
+                </a:solidFill>
+                <a:latin typeface="Consolas" panose="020B0609020204030204" pitchFamily="49" charset="0"/>
+              </a:rPr>
+              <a:t>2</a:t>
+            </a:r>
+          </a:p>
+          <a:p>
+            <a:pPr algn="r"/>
+            <a:r>
+              <a:rPr lang="en-US" sz="2400" dirty="0">
+                <a:solidFill>
+                  <a:schemeClr val="accent3">
+                    <a:lumMod val="50000"/>
+                  </a:schemeClr>
+                </a:solidFill>
+                <a:latin typeface="Consolas" panose="020B0609020204030204" pitchFamily="49" charset="0"/>
+              </a:rPr>
+              <a:t>3</a:t>
+            </a:r>
+          </a:p>
+          <a:p>
+            <a:pPr algn="r"/>
+            <a:r>
+              <a:rPr lang="en-US" sz="2400" dirty="0">
+                <a:solidFill>
+                  <a:schemeClr val="accent3">
+                    <a:lumMod val="50000"/>
+                  </a:schemeClr>
+                </a:solidFill>
+                <a:latin typeface="Consolas" panose="020B0609020204030204" pitchFamily="49" charset="0"/>
+              </a:rPr>
+              <a:t>4</a:t>
+            </a:r>
+          </a:p>
+          <a:p>
+            <a:pPr algn="r"/>
+            <a:r>
+              <a:rPr lang="en-US" sz="2400" dirty="0">
+                <a:solidFill>
+                  <a:schemeClr val="accent3">
+                    <a:lumMod val="50000"/>
+                  </a:schemeClr>
+                </a:solidFill>
+                <a:latin typeface="Consolas" panose="020B0609020204030204" pitchFamily="49" charset="0"/>
+              </a:rPr>
+              <a:t>5</a:t>
+            </a:r>
+          </a:p>
+          <a:p>
+            <a:pPr algn="r"/>
+            <a:r>
+              <a:rPr lang="en-US" sz="2400" dirty="0">
+                <a:solidFill>
+                  <a:schemeClr val="accent3">
+                    <a:lumMod val="50000"/>
+                  </a:schemeClr>
+                </a:solidFill>
+                <a:latin typeface="Consolas" panose="020B0609020204030204" pitchFamily="49" charset="0"/>
+              </a:rPr>
+              <a:t>6</a:t>
+            </a:r>
+          </a:p>
+          <a:p>
+            <a:pPr algn="r"/>
+            <a:r>
+              <a:rPr lang="en-US" sz="2400" dirty="0">
+                <a:solidFill>
+                  <a:schemeClr val="accent3">
+                    <a:lumMod val="50000"/>
+                  </a:schemeClr>
+                </a:solidFill>
+                <a:latin typeface="Consolas" panose="020B0609020204030204" pitchFamily="49" charset="0"/>
+              </a:rPr>
+              <a:t>7</a:t>
+            </a:r>
+          </a:p>
+          <a:p>
+            <a:pPr algn="r"/>
+            <a:r>
+              <a:rPr lang="en-US" sz="2400" dirty="0">
+                <a:solidFill>
+                  <a:schemeClr val="accent3">
+                    <a:lumMod val="50000"/>
+                  </a:schemeClr>
+                </a:solidFill>
+                <a:latin typeface="Consolas" panose="020B0609020204030204" pitchFamily="49" charset="0"/>
+              </a:rPr>
+              <a:t>8</a:t>
+            </a:r>
+          </a:p>
+          <a:p>
+            <a:pPr algn="r"/>
+            <a:r>
+              <a:rPr lang="en-US" sz="2400" dirty="0">
+                <a:solidFill>
+                  <a:schemeClr val="accent3">
+                    <a:lumMod val="50000"/>
+                  </a:schemeClr>
+                </a:solidFill>
+                <a:latin typeface="Consolas" panose="020B0609020204030204" pitchFamily="49" charset="0"/>
+              </a:rPr>
+              <a:t>9</a:t>
+            </a:r>
+          </a:p>
+          <a:p>
+            <a:pPr algn="r"/>
+            <a:r>
+              <a:rPr lang="en-US" sz="2400" dirty="0">
+                <a:solidFill>
+                  <a:schemeClr val="accent3">
+                    <a:lumMod val="50000"/>
+                  </a:schemeClr>
+                </a:solidFill>
+                <a:latin typeface="Consolas" panose="020B0609020204030204" pitchFamily="49" charset="0"/>
+              </a:rPr>
+              <a:t>10</a:t>
+            </a:r>
+          </a:p>
+          <a:p>
+            <a:pPr algn="r"/>
+            <a:r>
+              <a:rPr lang="en-US" sz="2400" dirty="0">
+                <a:solidFill>
+                  <a:schemeClr val="accent3">
+                    <a:lumMod val="50000"/>
+                  </a:schemeClr>
+                </a:solidFill>
+                <a:latin typeface="Consolas" panose="020B0609020204030204" pitchFamily="49" charset="0"/>
+              </a:rPr>
+              <a:t>11</a:t>
+            </a:r>
+          </a:p>
+          <a:p>
+            <a:pPr algn="r"/>
+            <a:r>
+              <a:rPr lang="en-US" sz="2400" dirty="0">
+                <a:solidFill>
+                  <a:schemeClr val="accent3">
+                    <a:lumMod val="50000"/>
+                  </a:schemeClr>
+                </a:solidFill>
+                <a:latin typeface="Consolas" panose="020B0609020204030204" pitchFamily="49" charset="0"/>
+              </a:rPr>
+              <a:t>12</a:t>
+            </a:r>
+          </a:p>
+          <a:p>
+            <a:pPr algn="r"/>
+            <a:r>
+              <a:rPr lang="en-US" sz="2400" dirty="0">
+                <a:solidFill>
+                  <a:schemeClr val="accent3">
+                    <a:lumMod val="50000"/>
+                  </a:schemeClr>
+                </a:solidFill>
+                <a:latin typeface="Consolas" panose="020B0609020204030204" pitchFamily="49" charset="0"/>
+              </a:rPr>
+              <a:t>13</a:t>
+            </a:r>
+          </a:p>
+          <a:p>
+            <a:pPr algn="r"/>
+            <a:r>
+              <a:rPr lang="en-US" sz="2400" dirty="0">
+                <a:solidFill>
+                  <a:schemeClr val="accent3">
+                    <a:lumMod val="50000"/>
+                  </a:schemeClr>
+                </a:solidFill>
+                <a:latin typeface="Consolas" panose="020B0609020204030204" pitchFamily="49" charset="0"/>
+              </a:rPr>
+              <a:t>14</a:t>
+            </a:r>
+          </a:p>
+          <a:p>
+            <a:pPr algn="r"/>
+            <a:r>
+              <a:rPr lang="en-US" sz="2400" dirty="0">
+                <a:solidFill>
+                  <a:schemeClr val="accent3">
+                    <a:lumMod val="50000"/>
+                  </a:schemeClr>
+                </a:solidFill>
+                <a:latin typeface="Consolas" panose="020B0609020204030204" pitchFamily="49" charset="0"/>
+              </a:rPr>
+              <a:t>15</a:t>
+            </a:r>
+          </a:p>
+          <a:p>
+            <a:pPr algn="r"/>
+            <a:r>
+              <a:rPr lang="en-US" sz="2400" dirty="0">
+                <a:solidFill>
+                  <a:schemeClr val="accent3">
+                    <a:lumMod val="50000"/>
+                  </a:schemeClr>
+                </a:solidFill>
+                <a:latin typeface="Consolas" panose="020B0609020204030204" pitchFamily="49" charset="0"/>
+              </a:rPr>
+              <a:t>16</a:t>
+            </a:r>
+          </a:p>
+          <a:p>
+            <a:pPr algn="r"/>
+            <a:endParaRPr lang="en-US" sz="2400" dirty="0">
+              <a:latin typeface="Consolas" panose="020B0609020204030204" pitchFamily="49" charset="0"/>
+            </a:endParaRPr>
+          </a:p>
+        </p:txBody>
+      </p:sp>
+      <p:sp>
+        <p:nvSpPr>
+          <p:cNvPr id="6" name="TextBox 5"/>
+          <p:cNvSpPr txBox="1"/>
+          <p:nvPr/>
+        </p:nvSpPr>
+        <p:spPr>
+          <a:xfrm>
+            <a:off x="935490" y="583973"/>
+            <a:ext cx="11256511" cy="3416320"/>
+          </a:xfrm>
+          <a:prstGeom prst="rect">
+            <a:avLst/>
+          </a:prstGeom>
+          <a:noFill/>
+        </p:spPr>
+        <p:txBody>
+          <a:bodyPr wrap="square" rtlCol="0">
+            <a:spAutoFit/>
+          </a:bodyPr>
+          <a:lstStyle/>
+          <a:p>
+            <a:pPr marL="0" indent="0">
+              <a:buNone/>
+            </a:pPr>
+            <a:r>
+              <a:rPr lang="en-US" sz="2400" dirty="0">
+                <a:solidFill>
+                  <a:srgbClr val="7030A0"/>
+                </a:solidFill>
+                <a:latin typeface="Consolas" panose="020B0609020204030204" pitchFamily="49" charset="0"/>
+              </a:rPr>
+              <a:t>&lt;?php</a:t>
+            </a:r>
+            <a:endParaRPr lang="en-US" sz="2400" dirty="0">
+              <a:latin typeface="Consolas" panose="020B0609020204030204" pitchFamily="49" charset="0"/>
+            </a:endParaRPr>
+          </a:p>
+          <a:p>
+            <a:pPr marL="0" indent="0">
+              <a:buNone/>
+            </a:pPr>
+            <a:endParaRPr lang="en-US" sz="2400" dirty="0">
+              <a:latin typeface="Consolas" panose="020B0609020204030204" pitchFamily="49" charset="0"/>
+            </a:endParaRPr>
+          </a:p>
+          <a:p>
+            <a:r>
+              <a:rPr lang="en-US" sz="2400" dirty="0">
+                <a:solidFill>
+                  <a:srgbClr val="0070C0"/>
+                </a:solidFill>
+                <a:latin typeface="Consolas" panose="020B0609020204030204" pitchFamily="49" charset="0"/>
+              </a:rPr>
+              <a:t>function</a:t>
+            </a:r>
+            <a:r>
+              <a:rPr lang="en-US" sz="2400" dirty="0">
+                <a:latin typeface="Consolas" panose="020B0609020204030204" pitchFamily="49" charset="0"/>
+              </a:rPr>
+              <a:t> foobar() {</a:t>
+            </a:r>
+          </a:p>
+          <a:p>
+            <a:endParaRPr lang="en-US" sz="2400" dirty="0">
+              <a:latin typeface="Consolas" panose="020B0609020204030204" pitchFamily="49" charset="0"/>
+            </a:endParaRPr>
+          </a:p>
+          <a:p>
+            <a:r>
+              <a:rPr lang="en-US" sz="2400" dirty="0">
+                <a:latin typeface="Consolas" panose="020B0609020204030204" pitchFamily="49" charset="0"/>
+              </a:rPr>
+              <a:t>    </a:t>
+            </a:r>
+            <a:r>
+              <a:rPr lang="en-US" sz="2400" dirty="0">
+                <a:solidFill>
+                  <a:srgbClr val="0070C0"/>
+                </a:solidFill>
+                <a:latin typeface="Consolas" panose="020B0609020204030204" pitchFamily="49" charset="0"/>
+              </a:rPr>
+              <a:t>echo</a:t>
+            </a:r>
+            <a:r>
+              <a:rPr lang="en-US" sz="2400" dirty="0">
+                <a:latin typeface="Consolas" panose="020B0609020204030204" pitchFamily="49" charset="0"/>
+              </a:rPr>
+              <a:t> </a:t>
+            </a:r>
+            <a:r>
+              <a:rPr lang="en-US" sz="2400" dirty="0">
+                <a:solidFill>
+                  <a:schemeClr val="accent2"/>
+                </a:solidFill>
+                <a:latin typeface="Consolas" panose="020B0609020204030204" pitchFamily="49" charset="0"/>
+              </a:rPr>
+              <a:t>"foobar"</a:t>
+            </a:r>
+            <a:r>
+              <a:rPr lang="en-US" sz="2400" dirty="0">
+                <a:latin typeface="Consolas" panose="020B0609020204030204" pitchFamily="49" charset="0"/>
+              </a:rPr>
+              <a:t>;</a:t>
+            </a:r>
+          </a:p>
+          <a:p>
+            <a:endParaRPr lang="en-US" sz="2400" dirty="0">
+              <a:latin typeface="Consolas" panose="020B0609020204030204" pitchFamily="49" charset="0"/>
+            </a:endParaRPr>
+          </a:p>
+          <a:p>
+            <a:r>
+              <a:rPr lang="en-US" sz="2400" dirty="0">
+                <a:latin typeface="Consolas" panose="020B0609020204030204" pitchFamily="49" charset="0"/>
+              </a:rPr>
+              <a:t>}</a:t>
+            </a:r>
+          </a:p>
+          <a:p>
+            <a:endParaRPr lang="en-US" sz="2400" dirty="0">
+              <a:latin typeface="Consolas" panose="020B0609020204030204" pitchFamily="49" charset="0"/>
+            </a:endParaRPr>
+          </a:p>
+          <a:p>
+            <a:r>
+              <a:rPr lang="en-US" sz="2400" dirty="0">
+                <a:latin typeface="Consolas" panose="020B0609020204030204" pitchFamily="49" charset="0"/>
+              </a:rPr>
+              <a:t>foobar();</a:t>
+            </a:r>
+          </a:p>
+        </p:txBody>
+      </p:sp>
+      <p:sp>
+        <p:nvSpPr>
+          <p:cNvPr id="2" name="Title 1"/>
+          <p:cNvSpPr>
+            <a:spLocks noGrp="1"/>
+          </p:cNvSpPr>
+          <p:nvPr>
+            <p:ph type="title"/>
+          </p:nvPr>
+        </p:nvSpPr>
+        <p:spPr>
+          <a:xfrm>
+            <a:off x="1" y="0"/>
+            <a:ext cx="12192000" cy="583973"/>
+          </a:xfrm>
+          <a:solidFill>
+            <a:schemeClr val="bg1">
+              <a:lumMod val="50000"/>
+            </a:schemeClr>
+          </a:solidFill>
+          <a:ln>
+            <a:noFill/>
+          </a:ln>
+        </p:spPr>
+        <p:style>
+          <a:lnRef idx="2">
+            <a:schemeClr val="accent3">
+              <a:shade val="50000"/>
+            </a:schemeClr>
+          </a:lnRef>
+          <a:fillRef idx="1">
+            <a:schemeClr val="accent3"/>
+          </a:fillRef>
+          <a:effectRef idx="0">
+            <a:schemeClr val="accent3"/>
+          </a:effectRef>
+          <a:fontRef idx="minor">
+            <a:schemeClr val="lt1"/>
+          </a:fontRef>
+        </p:style>
+        <p:txBody>
+          <a:bodyPr>
+            <a:normAutofit fontScale="90000"/>
+          </a:bodyPr>
+          <a:lstStyle/>
+          <a:p>
+            <a:pPr algn="ctr"/>
+            <a:r>
+              <a:rPr lang="en-US" sz="3600" dirty="0"/>
+              <a:t>Example 2-2 : Declaring Functions</a:t>
+            </a:r>
+          </a:p>
+        </p:txBody>
+      </p:sp>
+    </p:spTree>
+    <p:extLst>
+      <p:ext uri="{BB962C8B-B14F-4D97-AF65-F5344CB8AC3E}">
+        <p14:creationId xmlns:p14="http://schemas.microsoft.com/office/powerpoint/2010/main" val="655476403"/>
+      </p:ext>
+    </p:extLst>
+  </p:cSld>
+  <p:clrMapOvr>
+    <a:masterClrMapping/>
+  </p:clrMapOvr>
+</p:sld>
+</file>
+
+<file path=ppt/slides/slide21.xml><?xml version="1.0" encoding="utf-8"?>
+<p:sld xmlns:a="http://schemas.openxmlformats.org/drawingml/2006/main" xmlns:r="http://schemas.openxmlformats.org/officeDocument/2006/relationships" xmlns:p="http://schemas.openxmlformats.org/presentationml/2006/main">
+  <p:cSld>
+    <p:spTree>
+      <p:nvGrpSpPr>
+        <p:cNvPr id="1" name=""/>
+        <p:cNvGrpSpPr/>
+        <p:nvPr/>
+      </p:nvGrpSpPr>
+      <p:grpSpPr>
+        <a:xfrm>
+          <a:off x="0" y="0"/>
+          <a:ext cx="0" cy="0"/>
+          <a:chOff x="0" y="0"/>
+          <a:chExt cx="0" cy="0"/>
+        </a:xfrm>
+      </p:grpSpPr>
+      <p:sp>
+        <p:nvSpPr>
+          <p:cNvPr id="2" name="Title 1"/>
+          <p:cNvSpPr>
+            <a:spLocks noGrp="1"/>
+          </p:cNvSpPr>
+          <p:nvPr>
+            <p:ph type="title"/>
+          </p:nvPr>
+        </p:nvSpPr>
+        <p:spPr/>
+        <p:txBody>
+          <a:bodyPr/>
+          <a:lstStyle/>
+          <a:p>
+            <a:r>
+              <a:rPr lang="en-US" dirty="0"/>
+              <a:t>Arguments and return values</a:t>
+            </a:r>
+          </a:p>
+        </p:txBody>
+      </p:sp>
+      <p:sp>
+        <p:nvSpPr>
+          <p:cNvPr id="3" name="Content Placeholder 2"/>
+          <p:cNvSpPr>
+            <a:spLocks noGrp="1"/>
+          </p:cNvSpPr>
+          <p:nvPr>
+            <p:ph idx="1"/>
+          </p:nvPr>
+        </p:nvSpPr>
+        <p:spPr/>
+        <p:txBody>
+          <a:bodyPr/>
+          <a:lstStyle/>
+          <a:p>
+            <a:r>
+              <a:rPr lang="en-US" dirty="0"/>
+              <a:t>Arguments are given to your function through variables</a:t>
+            </a:r>
+          </a:p>
+          <a:p>
+            <a:r>
+              <a:rPr lang="en-US" dirty="0"/>
+              <a:t>Names for the arguments go in the parentheses in the declaration</a:t>
+            </a:r>
+          </a:p>
+          <a:p>
+            <a:r>
+              <a:rPr lang="en-US" dirty="0"/>
+              <a:t>Values are returned using the </a:t>
+            </a:r>
+            <a:r>
+              <a:rPr lang="en-US" sz="2400" dirty="0">
+                <a:solidFill>
+                  <a:srgbClr val="0070C0"/>
+                </a:solidFill>
+                <a:latin typeface="Consolas" panose="020B0609020204030204" pitchFamily="49" charset="0"/>
+              </a:rPr>
+              <a:t>return</a:t>
+            </a:r>
+            <a:r>
+              <a:rPr lang="en-US" dirty="0"/>
+              <a:t> keyword</a:t>
+            </a:r>
+          </a:p>
+          <a:p>
+            <a:r>
+              <a:rPr lang="en-US" sz="2400" dirty="0">
+                <a:solidFill>
+                  <a:srgbClr val="0070C0"/>
+                </a:solidFill>
+                <a:latin typeface="Consolas" panose="020B0609020204030204" pitchFamily="49" charset="0"/>
+              </a:rPr>
+              <a:t>return</a:t>
+            </a:r>
+            <a:r>
+              <a:rPr lang="en-US" dirty="0"/>
+              <a:t> is used like </a:t>
+            </a:r>
+            <a:r>
+              <a:rPr lang="en-US" sz="2400" dirty="0">
+                <a:solidFill>
+                  <a:srgbClr val="0070C0"/>
+                </a:solidFill>
+                <a:latin typeface="Consolas" panose="020B0609020204030204" pitchFamily="49" charset="0"/>
+              </a:rPr>
+              <a:t>echo</a:t>
+            </a:r>
+          </a:p>
+          <a:p>
+            <a:r>
+              <a:rPr lang="en-US" dirty="0"/>
+              <a:t>Code after the </a:t>
+            </a:r>
+            <a:r>
+              <a:rPr lang="en-US" sz="2400" dirty="0">
+                <a:solidFill>
+                  <a:srgbClr val="0070C0"/>
+                </a:solidFill>
+                <a:latin typeface="Consolas" panose="020B0609020204030204" pitchFamily="49" charset="0"/>
+              </a:rPr>
+              <a:t>return</a:t>
+            </a:r>
+            <a:r>
+              <a:rPr lang="en-US" dirty="0"/>
+              <a:t> statement is not run</a:t>
+            </a:r>
+          </a:p>
+        </p:txBody>
+      </p:sp>
+    </p:spTree>
+    <p:extLst>
+      <p:ext uri="{BB962C8B-B14F-4D97-AF65-F5344CB8AC3E}">
+        <p14:creationId xmlns:p14="http://schemas.microsoft.com/office/powerpoint/2010/main" val="1713286341"/>
+      </p:ext>
+    </p:extLst>
+  </p:cSld>
+  <p:clrMapOvr>
+    <a:masterClrMapping/>
+  </p:clrMapOvr>
+</p:sld>
+</file>
+
+<file path=ppt/slides/slide22.xml><?xml version="1.0" encoding="utf-8"?>
+<p:sld xmlns:a="http://schemas.openxmlformats.org/drawingml/2006/main" xmlns:r="http://schemas.openxmlformats.org/officeDocument/2006/relationships" xmlns:p="http://schemas.openxmlformats.org/presentationml/2006/main">
+  <p:cSld>
+    <p:spTree>
+      <p:nvGrpSpPr>
+        <p:cNvPr id="1" name=""/>
+        <p:cNvGrpSpPr/>
+        <p:nvPr/>
+      </p:nvGrpSpPr>
+      <p:grpSpPr>
+        <a:xfrm>
+          <a:off x="0" y="0"/>
+          <a:ext cx="0" cy="0"/>
+          <a:chOff x="0" y="0"/>
+          <a:chExt cx="0" cy="0"/>
+        </a:xfrm>
+      </p:grpSpPr>
+      <p:sp>
+        <p:nvSpPr>
+          <p:cNvPr id="5" name="TextBox 4"/>
+          <p:cNvSpPr txBox="1"/>
+          <p:nvPr/>
+        </p:nvSpPr>
+        <p:spPr>
+          <a:xfrm>
+            <a:off x="0" y="583973"/>
+            <a:ext cx="935489" cy="6370975"/>
+          </a:xfrm>
+          <a:prstGeom prst="rect">
+            <a:avLst/>
+          </a:prstGeom>
+          <a:solidFill>
+            <a:schemeClr val="bg1">
+              <a:lumMod val="85000"/>
+            </a:schemeClr>
+          </a:solidFill>
+        </p:spPr>
+        <p:txBody>
+          <a:bodyPr wrap="square" rtlCol="0" anchor="ctr">
+            <a:spAutoFit/>
+          </a:bodyPr>
+          <a:lstStyle/>
+          <a:p>
+            <a:pPr algn="r"/>
+            <a:r>
+              <a:rPr lang="en-US" sz="2400" dirty="0">
+                <a:solidFill>
+                  <a:schemeClr val="accent3">
+                    <a:lumMod val="50000"/>
+                  </a:schemeClr>
+                </a:solidFill>
+                <a:latin typeface="Consolas" panose="020B0609020204030204" pitchFamily="49" charset="0"/>
+              </a:rPr>
+              <a:t>1</a:t>
+            </a:r>
+          </a:p>
+          <a:p>
+            <a:pPr algn="r"/>
+            <a:r>
+              <a:rPr lang="en-US" sz="2400" dirty="0">
+                <a:solidFill>
+                  <a:schemeClr val="accent3">
+                    <a:lumMod val="50000"/>
+                  </a:schemeClr>
+                </a:solidFill>
+                <a:latin typeface="Consolas" panose="020B0609020204030204" pitchFamily="49" charset="0"/>
+              </a:rPr>
+              <a:t>2</a:t>
+            </a:r>
+          </a:p>
+          <a:p>
+            <a:pPr algn="r"/>
+            <a:r>
+              <a:rPr lang="en-US" sz="2400" dirty="0">
+                <a:solidFill>
+                  <a:schemeClr val="accent3">
+                    <a:lumMod val="50000"/>
+                  </a:schemeClr>
+                </a:solidFill>
+                <a:latin typeface="Consolas" panose="020B0609020204030204" pitchFamily="49" charset="0"/>
+              </a:rPr>
+              <a:t>3</a:t>
+            </a:r>
+          </a:p>
+          <a:p>
+            <a:pPr algn="r"/>
+            <a:r>
+              <a:rPr lang="en-US" sz="2400" dirty="0">
+                <a:solidFill>
+                  <a:schemeClr val="accent3">
+                    <a:lumMod val="50000"/>
+                  </a:schemeClr>
+                </a:solidFill>
+                <a:latin typeface="Consolas" panose="020B0609020204030204" pitchFamily="49" charset="0"/>
+              </a:rPr>
+              <a:t>4</a:t>
+            </a:r>
+          </a:p>
+          <a:p>
+            <a:pPr algn="r"/>
+            <a:r>
+              <a:rPr lang="en-US" sz="2400" dirty="0">
+                <a:solidFill>
+                  <a:schemeClr val="accent3">
+                    <a:lumMod val="50000"/>
+                  </a:schemeClr>
+                </a:solidFill>
+                <a:latin typeface="Consolas" panose="020B0609020204030204" pitchFamily="49" charset="0"/>
+              </a:rPr>
+              <a:t>5</a:t>
+            </a:r>
+          </a:p>
+          <a:p>
+            <a:pPr algn="r"/>
+            <a:r>
+              <a:rPr lang="en-US" sz="2400" dirty="0">
+                <a:solidFill>
+                  <a:schemeClr val="accent3">
+                    <a:lumMod val="50000"/>
+                  </a:schemeClr>
+                </a:solidFill>
+                <a:latin typeface="Consolas" panose="020B0609020204030204" pitchFamily="49" charset="0"/>
+              </a:rPr>
+              <a:t>6</a:t>
+            </a:r>
+          </a:p>
+          <a:p>
+            <a:pPr algn="r"/>
+            <a:r>
+              <a:rPr lang="en-US" sz="2400" dirty="0">
+                <a:solidFill>
+                  <a:schemeClr val="accent3">
+                    <a:lumMod val="50000"/>
+                  </a:schemeClr>
+                </a:solidFill>
+                <a:latin typeface="Consolas" panose="020B0609020204030204" pitchFamily="49" charset="0"/>
+              </a:rPr>
+              <a:t>7</a:t>
+            </a:r>
+          </a:p>
+          <a:p>
+            <a:pPr algn="r"/>
+            <a:r>
+              <a:rPr lang="en-US" sz="2400" dirty="0">
+                <a:solidFill>
+                  <a:schemeClr val="accent3">
+                    <a:lumMod val="50000"/>
+                  </a:schemeClr>
+                </a:solidFill>
+                <a:latin typeface="Consolas" panose="020B0609020204030204" pitchFamily="49" charset="0"/>
+              </a:rPr>
+              <a:t>8</a:t>
+            </a:r>
+          </a:p>
+          <a:p>
+            <a:pPr algn="r"/>
+            <a:r>
+              <a:rPr lang="en-US" sz="2400" dirty="0">
+                <a:solidFill>
+                  <a:schemeClr val="accent3">
+                    <a:lumMod val="50000"/>
+                  </a:schemeClr>
+                </a:solidFill>
+                <a:latin typeface="Consolas" panose="020B0609020204030204" pitchFamily="49" charset="0"/>
+              </a:rPr>
+              <a:t>9</a:t>
+            </a:r>
+          </a:p>
+          <a:p>
+            <a:pPr algn="r"/>
+            <a:r>
+              <a:rPr lang="en-US" sz="2400" dirty="0">
+                <a:solidFill>
+                  <a:schemeClr val="accent3">
+                    <a:lumMod val="50000"/>
+                  </a:schemeClr>
+                </a:solidFill>
+                <a:latin typeface="Consolas" panose="020B0609020204030204" pitchFamily="49" charset="0"/>
+              </a:rPr>
+              <a:t>10</a:t>
+            </a:r>
+          </a:p>
+          <a:p>
+            <a:pPr algn="r"/>
+            <a:r>
+              <a:rPr lang="en-US" sz="2400" dirty="0">
+                <a:solidFill>
+                  <a:schemeClr val="accent3">
+                    <a:lumMod val="50000"/>
+                  </a:schemeClr>
+                </a:solidFill>
+                <a:latin typeface="Consolas" panose="020B0609020204030204" pitchFamily="49" charset="0"/>
+              </a:rPr>
+              <a:t>11</a:t>
+            </a:r>
+          </a:p>
+          <a:p>
+            <a:pPr algn="r"/>
+            <a:r>
+              <a:rPr lang="en-US" sz="2400" dirty="0">
+                <a:solidFill>
+                  <a:schemeClr val="accent3">
+                    <a:lumMod val="50000"/>
+                  </a:schemeClr>
+                </a:solidFill>
+                <a:latin typeface="Consolas" panose="020B0609020204030204" pitchFamily="49" charset="0"/>
+              </a:rPr>
+              <a:t>12</a:t>
+            </a:r>
+          </a:p>
+          <a:p>
+            <a:pPr algn="r"/>
+            <a:r>
+              <a:rPr lang="en-US" sz="2400" dirty="0">
+                <a:solidFill>
+                  <a:schemeClr val="accent3">
+                    <a:lumMod val="50000"/>
+                  </a:schemeClr>
+                </a:solidFill>
+                <a:latin typeface="Consolas" panose="020B0609020204030204" pitchFamily="49" charset="0"/>
+              </a:rPr>
+              <a:t>13</a:t>
+            </a:r>
+          </a:p>
+          <a:p>
+            <a:pPr algn="r"/>
+            <a:r>
+              <a:rPr lang="en-US" sz="2400" dirty="0">
+                <a:solidFill>
+                  <a:schemeClr val="accent3">
+                    <a:lumMod val="50000"/>
+                  </a:schemeClr>
+                </a:solidFill>
+                <a:latin typeface="Consolas" panose="020B0609020204030204" pitchFamily="49" charset="0"/>
+              </a:rPr>
+              <a:t>14</a:t>
+            </a:r>
+          </a:p>
+          <a:p>
+            <a:pPr algn="r"/>
+            <a:r>
+              <a:rPr lang="en-US" sz="2400" dirty="0">
+                <a:solidFill>
+                  <a:schemeClr val="accent3">
+                    <a:lumMod val="50000"/>
+                  </a:schemeClr>
+                </a:solidFill>
+                <a:latin typeface="Consolas" panose="020B0609020204030204" pitchFamily="49" charset="0"/>
+              </a:rPr>
+              <a:t>15</a:t>
+            </a:r>
+          </a:p>
+          <a:p>
+            <a:pPr algn="r"/>
+            <a:r>
+              <a:rPr lang="en-US" sz="2400" dirty="0">
+                <a:solidFill>
+                  <a:schemeClr val="accent3">
+                    <a:lumMod val="50000"/>
+                  </a:schemeClr>
+                </a:solidFill>
+                <a:latin typeface="Consolas" panose="020B0609020204030204" pitchFamily="49" charset="0"/>
+              </a:rPr>
+              <a:t>16</a:t>
+            </a:r>
+          </a:p>
+          <a:p>
+            <a:pPr algn="r"/>
+            <a:endParaRPr lang="en-US" sz="2400" dirty="0">
+              <a:latin typeface="Consolas" panose="020B0609020204030204" pitchFamily="49" charset="0"/>
+            </a:endParaRPr>
+          </a:p>
+        </p:txBody>
+      </p:sp>
+      <p:sp>
+        <p:nvSpPr>
+          <p:cNvPr id="6" name="TextBox 5"/>
+          <p:cNvSpPr txBox="1"/>
+          <p:nvPr/>
+        </p:nvSpPr>
+        <p:spPr>
+          <a:xfrm>
+            <a:off x="935490" y="583973"/>
+            <a:ext cx="11256511" cy="3416320"/>
+          </a:xfrm>
+          <a:prstGeom prst="rect">
+            <a:avLst/>
+          </a:prstGeom>
+          <a:noFill/>
+        </p:spPr>
+        <p:txBody>
+          <a:bodyPr wrap="square" rtlCol="0">
+            <a:spAutoFit/>
+          </a:bodyPr>
+          <a:lstStyle/>
+          <a:p>
+            <a:pPr marL="0" indent="0">
+              <a:buNone/>
+            </a:pPr>
+            <a:r>
+              <a:rPr lang="en-US" sz="2400" dirty="0">
+                <a:solidFill>
+                  <a:srgbClr val="7030A0"/>
+                </a:solidFill>
+                <a:latin typeface="Consolas" panose="020B0609020204030204" pitchFamily="49" charset="0"/>
+              </a:rPr>
+              <a:t>&lt;?php</a:t>
+            </a:r>
+            <a:endParaRPr lang="en-US" sz="2400" dirty="0">
+              <a:latin typeface="Consolas" panose="020B0609020204030204" pitchFamily="49" charset="0"/>
+            </a:endParaRPr>
+          </a:p>
+          <a:p>
+            <a:pPr marL="0" indent="0">
+              <a:buNone/>
+            </a:pPr>
+            <a:endParaRPr lang="en-US" sz="2400" dirty="0">
+              <a:latin typeface="Consolas" panose="020B0609020204030204" pitchFamily="49" charset="0"/>
+            </a:endParaRPr>
+          </a:p>
+          <a:p>
+            <a:r>
+              <a:rPr lang="en-US" sz="2400" dirty="0">
+                <a:solidFill>
+                  <a:srgbClr val="0070C0"/>
+                </a:solidFill>
+                <a:latin typeface="Consolas" panose="020B0609020204030204" pitchFamily="49" charset="0"/>
+              </a:rPr>
+              <a:t>function</a:t>
+            </a:r>
+            <a:r>
+              <a:rPr lang="en-US" sz="2400" dirty="0">
+                <a:latin typeface="Consolas" panose="020B0609020204030204" pitchFamily="49" charset="0"/>
+              </a:rPr>
+              <a:t> </a:t>
+            </a:r>
+            <a:r>
+              <a:rPr lang="en-US" sz="2400" dirty="0" err="1">
+                <a:latin typeface="Consolas" panose="020B0609020204030204" pitchFamily="49" charset="0"/>
+              </a:rPr>
+              <a:t>addthree</a:t>
+            </a:r>
+            <a:r>
+              <a:rPr lang="en-US" sz="2400" dirty="0">
+                <a:latin typeface="Consolas" panose="020B0609020204030204" pitchFamily="49" charset="0"/>
+              </a:rPr>
+              <a:t>($num1, $num2, $num3) {</a:t>
+            </a:r>
+          </a:p>
+          <a:p>
+            <a:endParaRPr lang="en-US" sz="2400" dirty="0">
+              <a:latin typeface="Consolas" panose="020B0609020204030204" pitchFamily="49" charset="0"/>
+            </a:endParaRPr>
+          </a:p>
+          <a:p>
+            <a:r>
+              <a:rPr lang="en-US" sz="2400" dirty="0">
+                <a:latin typeface="Consolas" panose="020B0609020204030204" pitchFamily="49" charset="0"/>
+              </a:rPr>
+              <a:t>    </a:t>
+            </a:r>
+            <a:r>
+              <a:rPr lang="en-US" sz="2400" dirty="0">
+                <a:solidFill>
+                  <a:srgbClr val="0070C0"/>
+                </a:solidFill>
+                <a:latin typeface="Consolas" panose="020B0609020204030204" pitchFamily="49" charset="0"/>
+              </a:rPr>
+              <a:t>return</a:t>
+            </a:r>
+            <a:r>
+              <a:rPr lang="en-US" sz="2400" dirty="0">
+                <a:latin typeface="Consolas" panose="020B0609020204030204" pitchFamily="49" charset="0"/>
+              </a:rPr>
+              <a:t> $num1 + $num2 + $num3;</a:t>
+            </a:r>
+          </a:p>
+          <a:p>
+            <a:endParaRPr lang="en-US" sz="2400" dirty="0">
+              <a:latin typeface="Consolas" panose="020B0609020204030204" pitchFamily="49" charset="0"/>
+            </a:endParaRPr>
+          </a:p>
+          <a:p>
+            <a:r>
+              <a:rPr lang="en-US" sz="2400" dirty="0">
+                <a:latin typeface="Consolas" panose="020B0609020204030204" pitchFamily="49" charset="0"/>
+              </a:rPr>
+              <a:t>}</a:t>
+            </a:r>
+          </a:p>
+          <a:p>
+            <a:endParaRPr lang="en-US" sz="2400" dirty="0">
+              <a:latin typeface="Consolas" panose="020B0609020204030204" pitchFamily="49" charset="0"/>
+            </a:endParaRPr>
+          </a:p>
+          <a:p>
+            <a:r>
+              <a:rPr lang="en-US" sz="2400" dirty="0">
+                <a:solidFill>
+                  <a:srgbClr val="0070C0"/>
+                </a:solidFill>
+                <a:latin typeface="Consolas" panose="020B0609020204030204" pitchFamily="49" charset="0"/>
+              </a:rPr>
+              <a:t>echo</a:t>
+            </a:r>
+            <a:r>
+              <a:rPr lang="en-US" sz="2400" dirty="0">
+                <a:latin typeface="Consolas" panose="020B0609020204030204" pitchFamily="49" charset="0"/>
+              </a:rPr>
+              <a:t> </a:t>
+            </a:r>
+            <a:r>
+              <a:rPr lang="en-US" sz="2400" dirty="0" err="1">
+                <a:latin typeface="Consolas" panose="020B0609020204030204" pitchFamily="49" charset="0"/>
+              </a:rPr>
+              <a:t>addthree</a:t>
+            </a:r>
+            <a:r>
+              <a:rPr lang="en-US" sz="2400" dirty="0">
+                <a:latin typeface="Consolas" panose="020B0609020204030204" pitchFamily="49" charset="0"/>
+              </a:rPr>
+              <a:t>(</a:t>
+            </a:r>
+            <a:r>
+              <a:rPr lang="en-US" sz="2400" dirty="0">
+                <a:solidFill>
+                  <a:srgbClr val="C00000"/>
+                </a:solidFill>
+                <a:latin typeface="Consolas" panose="020B0609020204030204" pitchFamily="49" charset="0"/>
+              </a:rPr>
+              <a:t>2</a:t>
+            </a:r>
+            <a:r>
+              <a:rPr lang="en-US" sz="2400" dirty="0">
+                <a:latin typeface="Consolas" panose="020B0609020204030204" pitchFamily="49" charset="0"/>
+              </a:rPr>
+              <a:t>, </a:t>
+            </a:r>
+            <a:r>
+              <a:rPr lang="en-US" sz="2400" dirty="0">
+                <a:solidFill>
+                  <a:srgbClr val="C00000"/>
+                </a:solidFill>
+                <a:latin typeface="Consolas" panose="020B0609020204030204" pitchFamily="49" charset="0"/>
+              </a:rPr>
+              <a:t>4</a:t>
+            </a:r>
+            <a:r>
+              <a:rPr lang="en-US" sz="2400" dirty="0">
+                <a:latin typeface="Consolas" panose="020B0609020204030204" pitchFamily="49" charset="0"/>
+              </a:rPr>
+              <a:t>, </a:t>
+            </a:r>
+            <a:r>
+              <a:rPr lang="en-US" sz="2400" dirty="0">
+                <a:solidFill>
+                  <a:srgbClr val="C00000"/>
+                </a:solidFill>
+                <a:latin typeface="Consolas" panose="020B0609020204030204" pitchFamily="49" charset="0"/>
+              </a:rPr>
+              <a:t>6</a:t>
+            </a:r>
+            <a:r>
+              <a:rPr lang="en-US" sz="2400" dirty="0">
+                <a:latin typeface="Consolas" panose="020B0609020204030204" pitchFamily="49" charset="0"/>
+              </a:rPr>
+              <a:t>);</a:t>
+            </a:r>
+          </a:p>
+        </p:txBody>
+      </p:sp>
+      <p:sp>
+        <p:nvSpPr>
+          <p:cNvPr id="2" name="Title 1"/>
+          <p:cNvSpPr>
+            <a:spLocks noGrp="1"/>
+          </p:cNvSpPr>
+          <p:nvPr>
+            <p:ph type="title"/>
+          </p:nvPr>
+        </p:nvSpPr>
+        <p:spPr>
+          <a:xfrm>
+            <a:off x="1" y="0"/>
+            <a:ext cx="12192000" cy="583973"/>
+          </a:xfrm>
+          <a:solidFill>
+            <a:schemeClr val="bg1">
+              <a:lumMod val="50000"/>
+            </a:schemeClr>
+          </a:solidFill>
+          <a:ln>
+            <a:noFill/>
+          </a:ln>
+        </p:spPr>
+        <p:style>
+          <a:lnRef idx="2">
+            <a:schemeClr val="accent3">
+              <a:shade val="50000"/>
+            </a:schemeClr>
+          </a:lnRef>
+          <a:fillRef idx="1">
+            <a:schemeClr val="accent3"/>
+          </a:fillRef>
+          <a:effectRef idx="0">
+            <a:schemeClr val="accent3"/>
+          </a:effectRef>
+          <a:fontRef idx="minor">
+            <a:schemeClr val="lt1"/>
+          </a:fontRef>
+        </p:style>
+        <p:txBody>
+          <a:bodyPr>
+            <a:normAutofit fontScale="90000"/>
+          </a:bodyPr>
+          <a:lstStyle/>
+          <a:p>
+            <a:pPr algn="ctr"/>
+            <a:r>
+              <a:rPr lang="en-US" sz="3600" dirty="0"/>
+              <a:t>Example 2-3 : Arguments and Return Values</a:t>
+            </a:r>
+          </a:p>
+        </p:txBody>
+      </p:sp>
+    </p:spTree>
+    <p:extLst>
+      <p:ext uri="{BB962C8B-B14F-4D97-AF65-F5344CB8AC3E}">
+        <p14:creationId xmlns:p14="http://schemas.microsoft.com/office/powerpoint/2010/main" val="1971012813"/>
+      </p:ext>
+    </p:extLst>
+  </p:cSld>
+  <p:clrMapOvr>
+    <a:masterClrMapping/>
+  </p:clrMapOvr>
+</p:sld>
+</file>
+
+<file path=ppt/slides/slide23.xml><?xml version="1.0" encoding="utf-8"?>
+<p:sld xmlns:a="http://schemas.openxmlformats.org/drawingml/2006/main" xmlns:r="http://schemas.openxmlformats.org/officeDocument/2006/relationships" xmlns:p="http://schemas.openxmlformats.org/presentationml/2006/main">
+  <p:cSld>
+    <p:spTree>
+      <p:nvGrpSpPr>
+        <p:cNvPr id="1" name=""/>
+        <p:cNvGrpSpPr/>
+        <p:nvPr/>
+      </p:nvGrpSpPr>
+      <p:grpSpPr>
+        <a:xfrm>
+          <a:off x="0" y="0"/>
+          <a:ext cx="0" cy="0"/>
+          <a:chOff x="0" y="0"/>
+          <a:chExt cx="0" cy="0"/>
+        </a:xfrm>
+      </p:grpSpPr>
+      <p:sp>
+        <p:nvSpPr>
+          <p:cNvPr id="2" name="Title 1"/>
+          <p:cNvSpPr>
+            <a:spLocks noGrp="1"/>
+          </p:cNvSpPr>
+          <p:nvPr>
+            <p:ph type="title"/>
+          </p:nvPr>
+        </p:nvSpPr>
+        <p:spPr>
+          <a:xfrm>
+            <a:off x="831850" y="3622902"/>
+            <a:ext cx="10515600" cy="939573"/>
+          </a:xfrm>
+        </p:spPr>
+        <p:txBody>
+          <a:bodyPr/>
+          <a:lstStyle/>
+          <a:p>
+            <a:r>
+              <a:rPr lang="en-US" dirty="0"/>
+              <a:t>Arrays</a:t>
+            </a:r>
+          </a:p>
+        </p:txBody>
+      </p:sp>
+      <p:sp>
+        <p:nvSpPr>
+          <p:cNvPr id="3" name="Content Placeholder 2"/>
+          <p:cNvSpPr>
+            <a:spLocks noGrp="1"/>
+          </p:cNvSpPr>
+          <p:nvPr>
+            <p:ph type="body" idx="1"/>
+          </p:nvPr>
+        </p:nvSpPr>
+        <p:spPr>
+          <a:xfrm>
+            <a:off x="831850" y="3143704"/>
+            <a:ext cx="10515600" cy="479198"/>
+          </a:xfrm>
+        </p:spPr>
+        <p:txBody>
+          <a:bodyPr anchor="b"/>
+          <a:lstStyle/>
+          <a:p>
+            <a:r>
+              <a:rPr lang="en-US" dirty="0"/>
+              <a:t>Lesson 3</a:t>
+            </a:r>
+          </a:p>
+        </p:txBody>
+      </p:sp>
+    </p:spTree>
+    <p:extLst>
+      <p:ext uri="{BB962C8B-B14F-4D97-AF65-F5344CB8AC3E}">
+        <p14:creationId xmlns:p14="http://schemas.microsoft.com/office/powerpoint/2010/main" val="2923851807"/>
+      </p:ext>
+    </p:extLst>
+  </p:cSld>
+  <p:clrMapOvr>
+    <a:masterClrMapping/>
+  </p:clrMapOvr>
+</p:sld>
+</file>
+
+<file path=ppt/slides/slide24.xml><?xml version="1.0" encoding="utf-8"?>
+<p:sld xmlns:a="http://schemas.openxmlformats.org/drawingml/2006/main" xmlns:r="http://schemas.openxmlformats.org/officeDocument/2006/relationships" xmlns:p="http://schemas.openxmlformats.org/presentationml/2006/main">
+  <p:cSld>
+    <p:spTree>
+      <p:nvGrpSpPr>
+        <p:cNvPr id="1" name=""/>
+        <p:cNvGrpSpPr/>
+        <p:nvPr/>
+      </p:nvGrpSpPr>
+      <p:grpSpPr>
+        <a:xfrm>
+          <a:off x="0" y="0"/>
+          <a:ext cx="0" cy="0"/>
+          <a:chOff x="0" y="0"/>
+          <a:chExt cx="0" cy="0"/>
+        </a:xfrm>
+      </p:grpSpPr>
+      <p:sp>
+        <p:nvSpPr>
+          <p:cNvPr id="2" name="Title 1"/>
+          <p:cNvSpPr>
+            <a:spLocks noGrp="1"/>
+          </p:cNvSpPr>
+          <p:nvPr>
+            <p:ph type="title"/>
+          </p:nvPr>
+        </p:nvSpPr>
+        <p:spPr/>
+        <p:txBody>
+          <a:bodyPr/>
+          <a:lstStyle/>
+          <a:p>
+            <a:r>
+              <a:rPr lang="en-US" dirty="0"/>
+              <a:t>What is an array?</a:t>
+            </a:r>
+          </a:p>
+        </p:txBody>
+      </p:sp>
+      <p:sp>
+        <p:nvSpPr>
+          <p:cNvPr id="3" name="Text Placeholder 2"/>
+          <p:cNvSpPr>
+            <a:spLocks noGrp="1"/>
+          </p:cNvSpPr>
+          <p:nvPr>
+            <p:ph idx="1"/>
+          </p:nvPr>
+        </p:nvSpPr>
+        <p:spPr/>
+        <p:txBody>
+          <a:bodyPr/>
+          <a:lstStyle/>
+          <a:p>
+            <a:r>
+              <a:rPr lang="en-US" dirty="0"/>
+              <a:t>An array is a list of variables within a variable</a:t>
+            </a:r>
+          </a:p>
+          <a:p>
+            <a:r>
+              <a:rPr lang="en-US" b="1" dirty="0"/>
+              <a:t>Elements</a:t>
+            </a:r>
+            <a:r>
+              <a:rPr lang="en-US" dirty="0"/>
+              <a:t> (variables) in an array can be anything, even another array</a:t>
+            </a:r>
+            <a:endParaRPr lang="en-US" b="1" dirty="0"/>
+          </a:p>
+          <a:p>
+            <a:r>
+              <a:rPr lang="en-US" dirty="0"/>
+              <a:t>Each element</a:t>
+            </a:r>
+            <a:r>
+              <a:rPr lang="en-US" b="1" dirty="0"/>
+              <a:t> </a:t>
+            </a:r>
+            <a:r>
+              <a:rPr lang="en-US" dirty="0"/>
+              <a:t>in an array has a </a:t>
+            </a:r>
+            <a:r>
+              <a:rPr lang="en-US" b="1" dirty="0"/>
+              <a:t>key </a:t>
+            </a:r>
+            <a:r>
+              <a:rPr lang="en-US" dirty="0"/>
+              <a:t>(name) and a value</a:t>
+            </a:r>
+          </a:p>
+          <a:p>
+            <a:r>
+              <a:rPr lang="en-US" dirty="0"/>
+              <a:t>Keys can be integers or strings</a:t>
+            </a:r>
+          </a:p>
+        </p:txBody>
+      </p:sp>
+    </p:spTree>
+    <p:extLst>
+      <p:ext uri="{BB962C8B-B14F-4D97-AF65-F5344CB8AC3E}">
+        <p14:creationId xmlns:p14="http://schemas.microsoft.com/office/powerpoint/2010/main" val="1107590639"/>
+      </p:ext>
+    </p:extLst>
+  </p:cSld>
+  <p:clrMapOvr>
+    <a:masterClrMapping/>
+  </p:clrMapOvr>
+</p:sld>
+</file>
+
+<file path=ppt/slides/slide25.xml><?xml version="1.0" encoding="utf-8"?>
+<p:sld xmlns:a="http://schemas.openxmlformats.org/drawingml/2006/main" xmlns:r="http://schemas.openxmlformats.org/officeDocument/2006/relationships" xmlns:p="http://schemas.openxmlformats.org/presentationml/2006/main">
+  <p:cSld>
+    <p:spTree>
+      <p:nvGrpSpPr>
+        <p:cNvPr id="1" name=""/>
+        <p:cNvGrpSpPr/>
+        <p:nvPr/>
+      </p:nvGrpSpPr>
+      <p:grpSpPr>
+        <a:xfrm>
+          <a:off x="0" y="0"/>
+          <a:ext cx="0" cy="0"/>
+          <a:chOff x="0" y="0"/>
+          <a:chExt cx="0" cy="0"/>
+        </a:xfrm>
+      </p:grpSpPr>
+      <p:sp>
+        <p:nvSpPr>
+          <p:cNvPr id="2" name="Title 1"/>
+          <p:cNvSpPr>
+            <a:spLocks noGrp="1"/>
+          </p:cNvSpPr>
+          <p:nvPr>
+            <p:ph type="title"/>
+          </p:nvPr>
+        </p:nvSpPr>
+        <p:spPr/>
+        <p:txBody>
+          <a:bodyPr/>
+          <a:lstStyle/>
+          <a:p>
+            <a:r>
+              <a:rPr lang="en-US" dirty="0"/>
+              <a:t>Creating arrays</a:t>
+            </a:r>
+          </a:p>
+        </p:txBody>
+      </p:sp>
+      <p:sp>
+        <p:nvSpPr>
+          <p:cNvPr id="3" name="Content Placeholder 2"/>
+          <p:cNvSpPr>
+            <a:spLocks noGrp="1"/>
+          </p:cNvSpPr>
+          <p:nvPr>
+            <p:ph idx="1"/>
+          </p:nvPr>
+        </p:nvSpPr>
+        <p:spPr/>
+        <p:txBody>
+          <a:bodyPr/>
+          <a:lstStyle/>
+          <a:p>
+            <a:r>
+              <a:rPr lang="en-US" dirty="0"/>
+              <a:t>Arrays are created using brackets</a:t>
+            </a:r>
+          </a:p>
+          <a:p>
+            <a:r>
+              <a:rPr lang="en-US" dirty="0"/>
+              <a:t>Elements can be listed inside the brackets</a:t>
+            </a:r>
+          </a:p>
+          <a:p>
+            <a:r>
+              <a:rPr lang="en-US" dirty="0"/>
+              <a:t>Elements follow the format </a:t>
+            </a:r>
+            <a:r>
+              <a:rPr lang="en-US" sz="2400" dirty="0">
+                <a:latin typeface="Consolas" panose="020B0609020204030204" pitchFamily="49" charset="0"/>
+              </a:rPr>
+              <a:t>key =&gt; value,</a:t>
+            </a:r>
+          </a:p>
+          <a:p>
+            <a:r>
+              <a:rPr lang="en-US" dirty="0"/>
+              <a:t>Arrays can be stored to a variable using =</a:t>
+            </a:r>
+          </a:p>
+          <a:p>
+            <a:r>
+              <a:rPr lang="en-US" dirty="0"/>
+              <a:t>Elements are accessed by putting the key in brackets: </a:t>
+            </a:r>
+            <a:r>
+              <a:rPr lang="en-US" sz="2400" dirty="0">
+                <a:latin typeface="Consolas" panose="020B0609020204030204" pitchFamily="49" charset="0"/>
+              </a:rPr>
+              <a:t>[]</a:t>
+            </a:r>
+          </a:p>
+        </p:txBody>
+      </p:sp>
+    </p:spTree>
+    <p:extLst>
+      <p:ext uri="{BB962C8B-B14F-4D97-AF65-F5344CB8AC3E}">
+        <p14:creationId xmlns:p14="http://schemas.microsoft.com/office/powerpoint/2010/main" val="1172790237"/>
+      </p:ext>
+    </p:extLst>
+  </p:cSld>
+  <p:clrMapOvr>
+    <a:masterClrMapping/>
+  </p:clrMapOvr>
+</p:sld>
+</file>
+
+<file path=ppt/slides/slide26.xml><?xml version="1.0" encoding="utf-8"?>
+<p:sld xmlns:a="http://schemas.openxmlformats.org/drawingml/2006/main" xmlns:r="http://schemas.openxmlformats.org/officeDocument/2006/relationships" xmlns:p="http://schemas.openxmlformats.org/presentationml/2006/main">
+  <p:cSld>
+    <p:spTree>
+      <p:nvGrpSpPr>
+        <p:cNvPr id="1" name=""/>
+        <p:cNvGrpSpPr/>
+        <p:nvPr/>
+      </p:nvGrpSpPr>
+      <p:grpSpPr>
+        <a:xfrm>
+          <a:off x="0" y="0"/>
+          <a:ext cx="0" cy="0"/>
+          <a:chOff x="0" y="0"/>
+          <a:chExt cx="0" cy="0"/>
+        </a:xfrm>
+      </p:grpSpPr>
+      <p:sp>
+        <p:nvSpPr>
+          <p:cNvPr id="5" name="TextBox 4"/>
+          <p:cNvSpPr txBox="1"/>
+          <p:nvPr/>
+        </p:nvSpPr>
+        <p:spPr>
+          <a:xfrm>
+            <a:off x="0" y="583973"/>
+            <a:ext cx="935489" cy="6370975"/>
+          </a:xfrm>
+          <a:prstGeom prst="rect">
+            <a:avLst/>
+          </a:prstGeom>
+          <a:solidFill>
+            <a:schemeClr val="bg1">
+              <a:lumMod val="85000"/>
+            </a:schemeClr>
+          </a:solidFill>
+        </p:spPr>
+        <p:txBody>
+          <a:bodyPr wrap="square" rtlCol="0" anchor="ctr">
+            <a:spAutoFit/>
+          </a:bodyPr>
+          <a:lstStyle/>
+          <a:p>
+            <a:pPr algn="r"/>
+            <a:r>
+              <a:rPr lang="en-US" sz="2400" dirty="0">
+                <a:solidFill>
+                  <a:schemeClr val="accent3">
+                    <a:lumMod val="50000"/>
+                  </a:schemeClr>
+                </a:solidFill>
+                <a:latin typeface="Consolas" panose="020B0609020204030204" pitchFamily="49" charset="0"/>
+              </a:rPr>
+              <a:t>1</a:t>
+            </a:r>
+          </a:p>
+          <a:p>
+            <a:pPr algn="r"/>
+            <a:r>
+              <a:rPr lang="en-US" sz="2400" dirty="0">
+                <a:solidFill>
+                  <a:schemeClr val="accent3">
+                    <a:lumMod val="50000"/>
+                  </a:schemeClr>
+                </a:solidFill>
+                <a:latin typeface="Consolas" panose="020B0609020204030204" pitchFamily="49" charset="0"/>
+              </a:rPr>
+              <a:t>2</a:t>
+            </a:r>
+          </a:p>
+          <a:p>
+            <a:pPr algn="r"/>
+            <a:r>
+              <a:rPr lang="en-US" sz="2400" dirty="0">
+                <a:solidFill>
+                  <a:schemeClr val="accent3">
+                    <a:lumMod val="50000"/>
+                  </a:schemeClr>
+                </a:solidFill>
+                <a:latin typeface="Consolas" panose="020B0609020204030204" pitchFamily="49" charset="0"/>
+              </a:rPr>
+              <a:t>3</a:t>
+            </a:r>
+          </a:p>
+          <a:p>
+            <a:pPr algn="r"/>
+            <a:r>
+              <a:rPr lang="en-US" sz="2400" dirty="0">
+                <a:solidFill>
+                  <a:schemeClr val="accent3">
+                    <a:lumMod val="50000"/>
+                  </a:schemeClr>
+                </a:solidFill>
+                <a:latin typeface="Consolas" panose="020B0609020204030204" pitchFamily="49" charset="0"/>
+              </a:rPr>
+              <a:t>4</a:t>
+            </a:r>
+          </a:p>
+          <a:p>
+            <a:pPr algn="r"/>
+            <a:r>
+              <a:rPr lang="en-US" sz="2400" dirty="0">
+                <a:solidFill>
+                  <a:schemeClr val="accent3">
+                    <a:lumMod val="50000"/>
+                  </a:schemeClr>
+                </a:solidFill>
+                <a:latin typeface="Consolas" panose="020B0609020204030204" pitchFamily="49" charset="0"/>
+              </a:rPr>
+              <a:t>5</a:t>
+            </a:r>
+          </a:p>
+          <a:p>
+            <a:pPr algn="r"/>
+            <a:r>
+              <a:rPr lang="en-US" sz="2400" dirty="0">
+                <a:solidFill>
+                  <a:schemeClr val="accent3">
+                    <a:lumMod val="50000"/>
+                  </a:schemeClr>
+                </a:solidFill>
+                <a:latin typeface="Consolas" panose="020B0609020204030204" pitchFamily="49" charset="0"/>
+              </a:rPr>
+              <a:t>6</a:t>
+            </a:r>
+          </a:p>
+          <a:p>
+            <a:pPr algn="r"/>
+            <a:r>
+              <a:rPr lang="en-US" sz="2400" dirty="0">
+                <a:solidFill>
+                  <a:schemeClr val="accent3">
+                    <a:lumMod val="50000"/>
+                  </a:schemeClr>
+                </a:solidFill>
+                <a:latin typeface="Consolas" panose="020B0609020204030204" pitchFamily="49" charset="0"/>
+              </a:rPr>
+              <a:t>7</a:t>
+            </a:r>
+          </a:p>
+          <a:p>
+            <a:pPr algn="r"/>
+            <a:r>
+              <a:rPr lang="en-US" sz="2400" dirty="0">
+                <a:solidFill>
+                  <a:schemeClr val="accent3">
+                    <a:lumMod val="50000"/>
+                  </a:schemeClr>
+                </a:solidFill>
+                <a:latin typeface="Consolas" panose="020B0609020204030204" pitchFamily="49" charset="0"/>
+              </a:rPr>
+              <a:t>8</a:t>
+            </a:r>
+          </a:p>
+          <a:p>
+            <a:pPr algn="r"/>
+            <a:r>
+              <a:rPr lang="en-US" sz="2400" dirty="0">
+                <a:solidFill>
+                  <a:schemeClr val="accent3">
+                    <a:lumMod val="50000"/>
+                  </a:schemeClr>
+                </a:solidFill>
+                <a:latin typeface="Consolas" panose="020B0609020204030204" pitchFamily="49" charset="0"/>
+              </a:rPr>
+              <a:t>9</a:t>
+            </a:r>
+          </a:p>
+          <a:p>
+            <a:pPr algn="r"/>
+            <a:r>
+              <a:rPr lang="en-US" sz="2400" dirty="0">
+                <a:solidFill>
+                  <a:schemeClr val="accent3">
+                    <a:lumMod val="50000"/>
+                  </a:schemeClr>
+                </a:solidFill>
+                <a:latin typeface="Consolas" panose="020B0609020204030204" pitchFamily="49" charset="0"/>
+              </a:rPr>
+              <a:t>10</a:t>
+            </a:r>
+          </a:p>
+          <a:p>
+            <a:pPr algn="r"/>
+            <a:r>
+              <a:rPr lang="en-US" sz="2400" dirty="0">
+                <a:solidFill>
+                  <a:schemeClr val="accent3">
+                    <a:lumMod val="50000"/>
+                  </a:schemeClr>
+                </a:solidFill>
+                <a:latin typeface="Consolas" panose="020B0609020204030204" pitchFamily="49" charset="0"/>
+              </a:rPr>
+              <a:t>11</a:t>
+            </a:r>
+          </a:p>
+          <a:p>
+            <a:pPr algn="r"/>
+            <a:r>
+              <a:rPr lang="en-US" sz="2400" dirty="0">
+                <a:solidFill>
+                  <a:schemeClr val="accent3">
+                    <a:lumMod val="50000"/>
+                  </a:schemeClr>
+                </a:solidFill>
+                <a:latin typeface="Consolas" panose="020B0609020204030204" pitchFamily="49" charset="0"/>
+              </a:rPr>
+              <a:t>12</a:t>
+            </a:r>
+          </a:p>
+          <a:p>
+            <a:pPr algn="r"/>
+            <a:r>
+              <a:rPr lang="en-US" sz="2400" dirty="0">
+                <a:solidFill>
+                  <a:schemeClr val="accent3">
+                    <a:lumMod val="50000"/>
+                  </a:schemeClr>
+                </a:solidFill>
+                <a:latin typeface="Consolas" panose="020B0609020204030204" pitchFamily="49" charset="0"/>
+              </a:rPr>
+              <a:t>13</a:t>
+            </a:r>
+          </a:p>
+          <a:p>
+            <a:pPr algn="r"/>
+            <a:r>
+              <a:rPr lang="en-US" sz="2400" dirty="0">
+                <a:solidFill>
+                  <a:schemeClr val="accent3">
+                    <a:lumMod val="50000"/>
+                  </a:schemeClr>
+                </a:solidFill>
+                <a:latin typeface="Consolas" panose="020B0609020204030204" pitchFamily="49" charset="0"/>
+              </a:rPr>
+              <a:t>14</a:t>
+            </a:r>
+          </a:p>
+          <a:p>
+            <a:pPr algn="r"/>
+            <a:r>
+              <a:rPr lang="en-US" sz="2400" dirty="0">
+                <a:solidFill>
+                  <a:schemeClr val="accent3">
+                    <a:lumMod val="50000"/>
+                  </a:schemeClr>
+                </a:solidFill>
+                <a:latin typeface="Consolas" panose="020B0609020204030204" pitchFamily="49" charset="0"/>
+              </a:rPr>
+              <a:t>15</a:t>
+            </a:r>
+          </a:p>
+          <a:p>
+            <a:pPr algn="r"/>
+            <a:r>
+              <a:rPr lang="en-US" sz="2400" dirty="0">
+                <a:solidFill>
+                  <a:schemeClr val="accent3">
+                    <a:lumMod val="50000"/>
+                  </a:schemeClr>
+                </a:solidFill>
+                <a:latin typeface="Consolas" panose="020B0609020204030204" pitchFamily="49" charset="0"/>
+              </a:rPr>
+              <a:t>16</a:t>
+            </a:r>
+          </a:p>
+          <a:p>
+            <a:pPr algn="r"/>
+            <a:endParaRPr lang="en-US" sz="2400" dirty="0">
+              <a:latin typeface="Consolas" panose="020B0609020204030204" pitchFamily="49" charset="0"/>
+            </a:endParaRPr>
+          </a:p>
+        </p:txBody>
+      </p:sp>
+      <p:sp>
+        <p:nvSpPr>
+          <p:cNvPr id="6" name="TextBox 5"/>
+          <p:cNvSpPr txBox="1"/>
+          <p:nvPr/>
+        </p:nvSpPr>
+        <p:spPr>
+          <a:xfrm>
+            <a:off x="935490" y="583973"/>
+            <a:ext cx="11256511" cy="4154984"/>
+          </a:xfrm>
+          <a:prstGeom prst="rect">
+            <a:avLst/>
+          </a:prstGeom>
+          <a:noFill/>
+        </p:spPr>
+        <p:txBody>
+          <a:bodyPr wrap="square" rtlCol="0">
+            <a:spAutoFit/>
+          </a:bodyPr>
+          <a:lstStyle/>
+          <a:p>
+            <a:pPr marL="0" indent="0">
+              <a:buNone/>
+            </a:pPr>
+            <a:r>
+              <a:rPr lang="en-US" sz="2400" dirty="0">
+                <a:solidFill>
+                  <a:srgbClr val="7030A0"/>
+                </a:solidFill>
+                <a:latin typeface="Consolas" panose="020B0609020204030204" pitchFamily="49" charset="0"/>
+              </a:rPr>
+              <a:t>&lt;?php</a:t>
+            </a:r>
+            <a:endParaRPr lang="en-US" sz="2400" dirty="0">
+              <a:latin typeface="Consolas" panose="020B0609020204030204" pitchFamily="49" charset="0"/>
+            </a:endParaRPr>
+          </a:p>
+          <a:p>
+            <a:pPr marL="0" indent="0">
+              <a:buNone/>
+            </a:pPr>
+            <a:endParaRPr lang="en-US" sz="2400" dirty="0">
+              <a:latin typeface="Consolas" panose="020B0609020204030204" pitchFamily="49" charset="0"/>
+            </a:endParaRPr>
+          </a:p>
+          <a:p>
+            <a:r>
+              <a:rPr lang="en-US" sz="2400" dirty="0">
+                <a:latin typeface="Consolas" panose="020B0609020204030204" pitchFamily="49" charset="0"/>
+              </a:rPr>
+              <a:t>$array = [</a:t>
+            </a:r>
+          </a:p>
+          <a:p>
+            <a:r>
+              <a:rPr lang="en-US" sz="2400" dirty="0">
+                <a:latin typeface="Consolas" panose="020B0609020204030204" pitchFamily="49" charset="0"/>
+              </a:rPr>
+              <a:t>    </a:t>
+            </a:r>
+            <a:r>
+              <a:rPr lang="en-US" sz="2400" dirty="0">
+                <a:solidFill>
+                  <a:srgbClr val="C00000"/>
+                </a:solidFill>
+                <a:latin typeface="Consolas" panose="020B0609020204030204" pitchFamily="49" charset="0"/>
+              </a:rPr>
+              <a:t>1</a:t>
+            </a:r>
+            <a:r>
+              <a:rPr lang="en-US" sz="2400" dirty="0">
+                <a:latin typeface="Consolas" panose="020B0609020204030204" pitchFamily="49" charset="0"/>
+              </a:rPr>
+              <a:t> =&gt; </a:t>
+            </a:r>
+            <a:r>
+              <a:rPr lang="en-US" sz="2400" dirty="0">
+                <a:solidFill>
+                  <a:schemeClr val="accent2"/>
+                </a:solidFill>
+                <a:latin typeface="Consolas" panose="020B0609020204030204" pitchFamily="49" charset="0"/>
+              </a:rPr>
+              <a:t>"foo"</a:t>
+            </a:r>
+            <a:r>
+              <a:rPr lang="en-US" sz="2400" dirty="0">
+                <a:latin typeface="Consolas" panose="020B0609020204030204" pitchFamily="49" charset="0"/>
+              </a:rPr>
+              <a:t>,</a:t>
+            </a:r>
+          </a:p>
+          <a:p>
+            <a:r>
+              <a:rPr lang="en-US" sz="2400" dirty="0">
+                <a:latin typeface="Consolas" panose="020B0609020204030204" pitchFamily="49" charset="0"/>
+              </a:rPr>
+              <a:t>    </a:t>
+            </a:r>
+            <a:r>
+              <a:rPr lang="en-US" sz="2400" dirty="0">
+                <a:solidFill>
+                  <a:srgbClr val="C00000"/>
+                </a:solidFill>
+                <a:latin typeface="Consolas" panose="020B0609020204030204" pitchFamily="49" charset="0"/>
+              </a:rPr>
+              <a:t>2</a:t>
+            </a:r>
+            <a:r>
+              <a:rPr lang="en-US" sz="2400" dirty="0">
+                <a:latin typeface="Consolas" panose="020B0609020204030204" pitchFamily="49" charset="0"/>
+              </a:rPr>
+              <a:t> =&gt; </a:t>
+            </a:r>
+            <a:r>
+              <a:rPr lang="en-US" sz="2400" dirty="0">
+                <a:solidFill>
+                  <a:schemeClr val="accent2"/>
+                </a:solidFill>
+                <a:latin typeface="Consolas" panose="020B0609020204030204" pitchFamily="49" charset="0"/>
+              </a:rPr>
+              <a:t>"bar"</a:t>
+            </a:r>
+            <a:r>
+              <a:rPr lang="en-US" sz="2400" dirty="0">
+                <a:latin typeface="Consolas" panose="020B0609020204030204" pitchFamily="49" charset="0"/>
+              </a:rPr>
+              <a:t>,</a:t>
+            </a:r>
+          </a:p>
+          <a:p>
+            <a:r>
+              <a:rPr lang="en-US" sz="2400" dirty="0">
+                <a:latin typeface="Consolas" panose="020B0609020204030204" pitchFamily="49" charset="0"/>
+              </a:rPr>
+              <a:t>    </a:t>
+            </a:r>
+            <a:r>
+              <a:rPr lang="en-US" sz="2400" dirty="0">
+                <a:solidFill>
+                  <a:schemeClr val="accent2"/>
+                </a:solidFill>
+                <a:latin typeface="Consolas" panose="020B0609020204030204" pitchFamily="49" charset="0"/>
+              </a:rPr>
+              <a:t>"foobar" </a:t>
+            </a:r>
+            <a:r>
+              <a:rPr lang="en-US" sz="2400" dirty="0">
+                <a:latin typeface="Consolas" panose="020B0609020204030204" pitchFamily="49" charset="0"/>
+              </a:rPr>
+              <a:t>=&gt; </a:t>
+            </a:r>
+            <a:r>
+              <a:rPr lang="en-US" sz="2400" dirty="0">
+                <a:solidFill>
+                  <a:srgbClr val="C00000"/>
+                </a:solidFill>
+                <a:latin typeface="Consolas" panose="020B0609020204030204" pitchFamily="49" charset="0"/>
+              </a:rPr>
+              <a:t>10</a:t>
+            </a:r>
+            <a:r>
+              <a:rPr lang="en-US" sz="2400" dirty="0">
+                <a:latin typeface="Consolas" panose="020B0609020204030204" pitchFamily="49" charset="0"/>
+              </a:rPr>
+              <a:t>,</a:t>
+            </a:r>
+          </a:p>
+          <a:p>
+            <a:r>
+              <a:rPr lang="en-US" sz="2400" dirty="0">
+                <a:latin typeface="Consolas" panose="020B0609020204030204" pitchFamily="49" charset="0"/>
+              </a:rPr>
+              <a:t>];</a:t>
+            </a:r>
+          </a:p>
+          <a:p>
+            <a:endParaRPr lang="en-US" sz="2400" dirty="0">
+              <a:latin typeface="Consolas" panose="020B0609020204030204" pitchFamily="49" charset="0"/>
+            </a:endParaRPr>
+          </a:p>
+          <a:p>
+            <a:r>
+              <a:rPr lang="en-US" sz="2400" dirty="0">
+                <a:solidFill>
+                  <a:srgbClr val="0070C0"/>
+                </a:solidFill>
+                <a:latin typeface="Consolas" panose="020B0609020204030204" pitchFamily="49" charset="0"/>
+              </a:rPr>
+              <a:t>echo</a:t>
+            </a:r>
+            <a:r>
+              <a:rPr lang="en-US" sz="2400" dirty="0">
+                <a:latin typeface="Consolas" panose="020B0609020204030204" pitchFamily="49" charset="0"/>
+              </a:rPr>
+              <a:t> $array[</a:t>
+            </a:r>
+            <a:r>
+              <a:rPr lang="en-US" sz="2400" dirty="0">
+                <a:solidFill>
+                  <a:srgbClr val="C00000"/>
+                </a:solidFill>
+                <a:latin typeface="Consolas" panose="020B0609020204030204" pitchFamily="49" charset="0"/>
+              </a:rPr>
+              <a:t>2</a:t>
+            </a:r>
+            <a:r>
+              <a:rPr lang="en-US" sz="2400" dirty="0">
+                <a:latin typeface="Consolas" panose="020B0609020204030204" pitchFamily="49" charset="0"/>
+              </a:rPr>
+              <a:t>];</a:t>
+            </a:r>
+          </a:p>
+          <a:p>
+            <a:endParaRPr lang="en-US" sz="2400" dirty="0">
+              <a:solidFill>
+                <a:srgbClr val="0070C0"/>
+              </a:solidFill>
+              <a:latin typeface="Consolas" panose="020B0609020204030204" pitchFamily="49" charset="0"/>
+            </a:endParaRPr>
+          </a:p>
+          <a:p>
+            <a:r>
+              <a:rPr lang="en-US" sz="2400" dirty="0" err="1">
+                <a:latin typeface="Consolas" panose="020B0609020204030204" pitchFamily="49" charset="0"/>
+              </a:rPr>
+              <a:t>var_dump</a:t>
+            </a:r>
+            <a:r>
+              <a:rPr lang="en-US" sz="2400" dirty="0">
+                <a:latin typeface="Consolas" panose="020B0609020204030204" pitchFamily="49" charset="0"/>
+              </a:rPr>
+              <a:t>($array);</a:t>
+            </a:r>
+          </a:p>
+        </p:txBody>
+      </p:sp>
+      <p:sp>
+        <p:nvSpPr>
+          <p:cNvPr id="2" name="Title 1"/>
+          <p:cNvSpPr>
+            <a:spLocks noGrp="1"/>
+          </p:cNvSpPr>
+          <p:nvPr>
+            <p:ph type="title"/>
+          </p:nvPr>
+        </p:nvSpPr>
+        <p:spPr>
+          <a:xfrm>
+            <a:off x="1" y="0"/>
+            <a:ext cx="12192000" cy="583973"/>
+          </a:xfrm>
+          <a:solidFill>
+            <a:schemeClr val="bg1">
+              <a:lumMod val="50000"/>
+            </a:schemeClr>
+          </a:solidFill>
+          <a:ln>
+            <a:noFill/>
+          </a:ln>
+        </p:spPr>
+        <p:style>
+          <a:lnRef idx="2">
+            <a:schemeClr val="accent3">
+              <a:shade val="50000"/>
+            </a:schemeClr>
+          </a:lnRef>
+          <a:fillRef idx="1">
+            <a:schemeClr val="accent3"/>
+          </a:fillRef>
+          <a:effectRef idx="0">
+            <a:schemeClr val="accent3"/>
+          </a:effectRef>
+          <a:fontRef idx="minor">
+            <a:schemeClr val="lt1"/>
+          </a:fontRef>
+        </p:style>
+        <p:txBody>
+          <a:bodyPr>
+            <a:normAutofit fontScale="90000"/>
+          </a:bodyPr>
+          <a:lstStyle/>
+          <a:p>
+            <a:pPr algn="ctr"/>
+            <a:r>
+              <a:rPr lang="en-US" sz="3600" dirty="0"/>
+              <a:t>Example 3-1 : Basic Arrays</a:t>
+            </a:r>
+          </a:p>
+        </p:txBody>
+      </p:sp>
+    </p:spTree>
+    <p:extLst>
+      <p:ext uri="{BB962C8B-B14F-4D97-AF65-F5344CB8AC3E}">
+        <p14:creationId xmlns:p14="http://schemas.microsoft.com/office/powerpoint/2010/main" val="685522219"/>
+      </p:ext>
+    </p:extLst>
+  </p:cSld>
+  <p:clrMapOvr>
+    <a:masterClrMapping/>
+  </p:clrMapOvr>
+</p:sld>
+</file>
+
+<file path=ppt/slides/slide27.xml><?xml version="1.0" encoding="utf-8"?>
+<p:sld xmlns:a="http://schemas.openxmlformats.org/drawingml/2006/main" xmlns:r="http://schemas.openxmlformats.org/officeDocument/2006/relationships" xmlns:p="http://schemas.openxmlformats.org/presentationml/2006/main">
+  <p:cSld>
+    <p:spTree>
+      <p:nvGrpSpPr>
+        <p:cNvPr id="1" name=""/>
+        <p:cNvGrpSpPr/>
+        <p:nvPr/>
+      </p:nvGrpSpPr>
+      <p:grpSpPr>
+        <a:xfrm>
+          <a:off x="0" y="0"/>
+          <a:ext cx="0" cy="0"/>
+          <a:chOff x="0" y="0"/>
+          <a:chExt cx="0" cy="0"/>
+        </a:xfrm>
+      </p:grpSpPr>
+      <p:sp>
+        <p:nvSpPr>
+          <p:cNvPr id="2" name="Title 1"/>
+          <p:cNvSpPr>
+            <a:spLocks noGrp="1"/>
+          </p:cNvSpPr>
+          <p:nvPr>
+            <p:ph type="title"/>
+          </p:nvPr>
+        </p:nvSpPr>
+        <p:spPr/>
+        <p:txBody>
+          <a:bodyPr/>
+          <a:lstStyle/>
+          <a:p>
+            <a:r>
+              <a:rPr lang="en-US" dirty="0"/>
+              <a:t>Adding and Removing Elements</a:t>
+            </a:r>
+          </a:p>
+        </p:txBody>
+      </p:sp>
+      <p:sp>
+        <p:nvSpPr>
+          <p:cNvPr id="3" name="Content Placeholder 2"/>
+          <p:cNvSpPr>
+            <a:spLocks noGrp="1"/>
+          </p:cNvSpPr>
+          <p:nvPr>
+            <p:ph idx="1"/>
+          </p:nvPr>
+        </p:nvSpPr>
+        <p:spPr/>
+        <p:txBody>
+          <a:bodyPr/>
+          <a:lstStyle/>
+          <a:p>
+            <a:r>
+              <a:rPr lang="en-US" dirty="0"/>
+              <a:t>Values can be set using =</a:t>
+            </a:r>
+          </a:p>
+          <a:p>
+            <a:r>
+              <a:rPr lang="en-US" dirty="0"/>
+              <a:t>= will create elements which do not exist</a:t>
+            </a:r>
+          </a:p>
+          <a:p>
+            <a:r>
+              <a:rPr lang="en-US" dirty="0"/>
+              <a:t>Elements can be removed using </a:t>
+            </a:r>
+            <a:r>
+              <a:rPr lang="en-US" sz="2400" dirty="0">
+                <a:latin typeface="Consolas" panose="020B0609020204030204" pitchFamily="49" charset="0"/>
+              </a:rPr>
+              <a:t>unset()</a:t>
+            </a:r>
+          </a:p>
+        </p:txBody>
+      </p:sp>
+    </p:spTree>
+    <p:extLst>
+      <p:ext uri="{BB962C8B-B14F-4D97-AF65-F5344CB8AC3E}">
+        <p14:creationId xmlns:p14="http://schemas.microsoft.com/office/powerpoint/2010/main" val="121302743"/>
+      </p:ext>
+    </p:extLst>
+  </p:cSld>
+  <p:clrMapOvr>
+    <a:masterClrMapping/>
+  </p:clrMapOvr>
+</p:sld>
+</file>
+
+<file path=ppt/slides/slide28.xml><?xml version="1.0" encoding="utf-8"?>
+<p:sld xmlns:a="http://schemas.openxmlformats.org/drawingml/2006/main" xmlns:r="http://schemas.openxmlformats.org/officeDocument/2006/relationships" xmlns:p="http://schemas.openxmlformats.org/presentationml/2006/main">
+  <p:cSld>
+    <p:spTree>
+      <p:nvGrpSpPr>
+        <p:cNvPr id="1" name=""/>
+        <p:cNvGrpSpPr/>
+        <p:nvPr/>
+      </p:nvGrpSpPr>
+      <p:grpSpPr>
+        <a:xfrm>
+          <a:off x="0" y="0"/>
+          <a:ext cx="0" cy="0"/>
+          <a:chOff x="0" y="0"/>
+          <a:chExt cx="0" cy="0"/>
+        </a:xfrm>
+      </p:grpSpPr>
+      <p:sp>
+        <p:nvSpPr>
+          <p:cNvPr id="5" name="TextBox 4"/>
+          <p:cNvSpPr txBox="1"/>
+          <p:nvPr/>
+        </p:nvSpPr>
+        <p:spPr>
+          <a:xfrm>
+            <a:off x="0" y="583973"/>
+            <a:ext cx="935489" cy="6370975"/>
+          </a:xfrm>
+          <a:prstGeom prst="rect">
+            <a:avLst/>
+          </a:prstGeom>
+          <a:solidFill>
+            <a:schemeClr val="bg1">
+              <a:lumMod val="85000"/>
+            </a:schemeClr>
+          </a:solidFill>
+        </p:spPr>
+        <p:txBody>
+          <a:bodyPr wrap="square" rtlCol="0" anchor="ctr">
+            <a:spAutoFit/>
+          </a:bodyPr>
+          <a:lstStyle/>
+          <a:p>
+            <a:pPr algn="r"/>
+            <a:r>
+              <a:rPr lang="en-US" sz="2400" dirty="0">
+                <a:solidFill>
+                  <a:schemeClr val="accent3">
+                    <a:lumMod val="50000"/>
+                  </a:schemeClr>
+                </a:solidFill>
+                <a:latin typeface="Consolas" panose="020B0609020204030204" pitchFamily="49" charset="0"/>
+              </a:rPr>
+              <a:t>1</a:t>
+            </a:r>
+          </a:p>
+          <a:p>
+            <a:pPr algn="r"/>
+            <a:r>
+              <a:rPr lang="en-US" sz="2400" dirty="0">
+                <a:solidFill>
+                  <a:schemeClr val="accent3">
+                    <a:lumMod val="50000"/>
+                  </a:schemeClr>
+                </a:solidFill>
+                <a:latin typeface="Consolas" panose="020B0609020204030204" pitchFamily="49" charset="0"/>
+              </a:rPr>
+              <a:t>2</a:t>
+            </a:r>
+          </a:p>
+          <a:p>
+            <a:pPr algn="r"/>
+            <a:r>
+              <a:rPr lang="en-US" sz="2400" dirty="0">
+                <a:solidFill>
+                  <a:schemeClr val="accent3">
+                    <a:lumMod val="50000"/>
+                  </a:schemeClr>
+                </a:solidFill>
+                <a:latin typeface="Consolas" panose="020B0609020204030204" pitchFamily="49" charset="0"/>
+              </a:rPr>
+              <a:t>3</a:t>
+            </a:r>
+          </a:p>
+          <a:p>
+            <a:pPr algn="r"/>
+            <a:r>
+              <a:rPr lang="en-US" sz="2400" dirty="0">
+                <a:solidFill>
+                  <a:schemeClr val="accent3">
+                    <a:lumMod val="50000"/>
+                  </a:schemeClr>
+                </a:solidFill>
+                <a:latin typeface="Consolas" panose="020B0609020204030204" pitchFamily="49" charset="0"/>
+              </a:rPr>
+              <a:t>4</a:t>
+            </a:r>
+          </a:p>
+          <a:p>
+            <a:pPr algn="r"/>
+            <a:r>
+              <a:rPr lang="en-US" sz="2400" dirty="0">
+                <a:solidFill>
+                  <a:schemeClr val="accent3">
+                    <a:lumMod val="50000"/>
+                  </a:schemeClr>
+                </a:solidFill>
+                <a:latin typeface="Consolas" panose="020B0609020204030204" pitchFamily="49" charset="0"/>
+              </a:rPr>
+              <a:t>5</a:t>
+            </a:r>
+          </a:p>
+          <a:p>
+            <a:pPr algn="r"/>
+            <a:r>
+              <a:rPr lang="en-US" sz="2400" dirty="0">
+                <a:solidFill>
+                  <a:schemeClr val="accent3">
+                    <a:lumMod val="50000"/>
+                  </a:schemeClr>
+                </a:solidFill>
+                <a:latin typeface="Consolas" panose="020B0609020204030204" pitchFamily="49" charset="0"/>
+              </a:rPr>
+              <a:t>6</a:t>
+            </a:r>
+          </a:p>
+          <a:p>
+            <a:pPr algn="r"/>
+            <a:r>
+              <a:rPr lang="en-US" sz="2400" dirty="0">
+                <a:solidFill>
+                  <a:schemeClr val="accent3">
+                    <a:lumMod val="50000"/>
+                  </a:schemeClr>
+                </a:solidFill>
+                <a:latin typeface="Consolas" panose="020B0609020204030204" pitchFamily="49" charset="0"/>
+              </a:rPr>
+              <a:t>7</a:t>
+            </a:r>
+          </a:p>
+          <a:p>
+            <a:pPr algn="r"/>
+            <a:r>
+              <a:rPr lang="en-US" sz="2400" dirty="0">
+                <a:solidFill>
+                  <a:schemeClr val="accent3">
+                    <a:lumMod val="50000"/>
+                  </a:schemeClr>
+                </a:solidFill>
+                <a:latin typeface="Consolas" panose="020B0609020204030204" pitchFamily="49" charset="0"/>
+              </a:rPr>
+              <a:t>8</a:t>
+            </a:r>
+          </a:p>
+          <a:p>
+            <a:pPr algn="r"/>
+            <a:r>
+              <a:rPr lang="en-US" sz="2400" dirty="0">
+                <a:solidFill>
+                  <a:schemeClr val="accent3">
+                    <a:lumMod val="50000"/>
+                  </a:schemeClr>
+                </a:solidFill>
+                <a:latin typeface="Consolas" panose="020B0609020204030204" pitchFamily="49" charset="0"/>
+              </a:rPr>
+              <a:t>9</a:t>
+            </a:r>
+          </a:p>
+          <a:p>
+            <a:pPr algn="r"/>
+            <a:r>
+              <a:rPr lang="en-US" sz="2400" dirty="0">
+                <a:solidFill>
+                  <a:schemeClr val="accent3">
+                    <a:lumMod val="50000"/>
+                  </a:schemeClr>
+                </a:solidFill>
+                <a:latin typeface="Consolas" panose="020B0609020204030204" pitchFamily="49" charset="0"/>
+              </a:rPr>
+              <a:t>10</a:t>
+            </a:r>
+          </a:p>
+          <a:p>
+            <a:pPr algn="r"/>
+            <a:r>
+              <a:rPr lang="en-US" sz="2400" dirty="0">
+                <a:solidFill>
+                  <a:schemeClr val="accent3">
+                    <a:lumMod val="50000"/>
+                  </a:schemeClr>
+                </a:solidFill>
+                <a:latin typeface="Consolas" panose="020B0609020204030204" pitchFamily="49" charset="0"/>
+              </a:rPr>
+              <a:t>11</a:t>
+            </a:r>
+          </a:p>
+          <a:p>
+            <a:pPr algn="r"/>
+            <a:r>
+              <a:rPr lang="en-US" sz="2400" dirty="0">
+                <a:solidFill>
+                  <a:schemeClr val="accent3">
+                    <a:lumMod val="50000"/>
+                  </a:schemeClr>
+                </a:solidFill>
+                <a:latin typeface="Consolas" panose="020B0609020204030204" pitchFamily="49" charset="0"/>
+              </a:rPr>
+              <a:t>12</a:t>
+            </a:r>
+          </a:p>
+          <a:p>
+            <a:pPr algn="r"/>
+            <a:r>
+              <a:rPr lang="en-US" sz="2400" dirty="0">
+                <a:solidFill>
+                  <a:schemeClr val="accent3">
+                    <a:lumMod val="50000"/>
+                  </a:schemeClr>
+                </a:solidFill>
+                <a:latin typeface="Consolas" panose="020B0609020204030204" pitchFamily="49" charset="0"/>
+              </a:rPr>
+              <a:t>13</a:t>
+            </a:r>
+          </a:p>
+          <a:p>
+            <a:pPr algn="r"/>
+            <a:r>
+              <a:rPr lang="en-US" sz="2400" dirty="0">
+                <a:solidFill>
+                  <a:schemeClr val="accent3">
+                    <a:lumMod val="50000"/>
+                  </a:schemeClr>
+                </a:solidFill>
+                <a:latin typeface="Consolas" panose="020B0609020204030204" pitchFamily="49" charset="0"/>
+              </a:rPr>
+              <a:t>14</a:t>
+            </a:r>
+          </a:p>
+          <a:p>
+            <a:pPr algn="r"/>
+            <a:r>
+              <a:rPr lang="en-US" sz="2400" dirty="0">
+                <a:solidFill>
+                  <a:schemeClr val="accent3">
+                    <a:lumMod val="50000"/>
+                  </a:schemeClr>
+                </a:solidFill>
+                <a:latin typeface="Consolas" panose="020B0609020204030204" pitchFamily="49" charset="0"/>
+              </a:rPr>
+              <a:t>15</a:t>
+            </a:r>
+          </a:p>
+          <a:p>
+            <a:pPr algn="r"/>
+            <a:r>
+              <a:rPr lang="en-US" sz="2400" dirty="0">
+                <a:solidFill>
+                  <a:schemeClr val="accent3">
+                    <a:lumMod val="50000"/>
+                  </a:schemeClr>
+                </a:solidFill>
+                <a:latin typeface="Consolas" panose="020B0609020204030204" pitchFamily="49" charset="0"/>
+              </a:rPr>
+              <a:t>16</a:t>
+            </a:r>
+          </a:p>
+          <a:p>
+            <a:pPr algn="r"/>
+            <a:endParaRPr lang="en-US" sz="2400" dirty="0">
+              <a:latin typeface="Consolas" panose="020B0609020204030204" pitchFamily="49" charset="0"/>
+            </a:endParaRPr>
+          </a:p>
+        </p:txBody>
+      </p:sp>
+      <p:sp>
+        <p:nvSpPr>
+          <p:cNvPr id="6" name="TextBox 5"/>
+          <p:cNvSpPr txBox="1"/>
+          <p:nvPr/>
+        </p:nvSpPr>
+        <p:spPr>
+          <a:xfrm>
+            <a:off x="935490" y="583973"/>
+            <a:ext cx="11256511" cy="4893647"/>
+          </a:xfrm>
+          <a:prstGeom prst="rect">
+            <a:avLst/>
+          </a:prstGeom>
+          <a:noFill/>
+        </p:spPr>
+        <p:txBody>
+          <a:bodyPr wrap="square" rtlCol="0">
+            <a:spAutoFit/>
+          </a:bodyPr>
+          <a:lstStyle/>
+          <a:p>
+            <a:pPr marL="0" indent="0">
+              <a:buNone/>
+            </a:pPr>
+            <a:r>
+              <a:rPr lang="en-US" sz="2400" dirty="0">
+                <a:solidFill>
+                  <a:srgbClr val="7030A0"/>
+                </a:solidFill>
+                <a:latin typeface="Consolas" panose="020B0609020204030204" pitchFamily="49" charset="0"/>
+              </a:rPr>
+              <a:t>&lt;?php</a:t>
+            </a:r>
+            <a:endParaRPr lang="en-US" sz="2400" dirty="0">
+              <a:latin typeface="Consolas" panose="020B0609020204030204" pitchFamily="49" charset="0"/>
+            </a:endParaRPr>
+          </a:p>
+          <a:p>
+            <a:pPr marL="0" indent="0">
+              <a:buNone/>
+            </a:pPr>
+            <a:endParaRPr lang="en-US" sz="2400" dirty="0">
+              <a:latin typeface="Consolas" panose="020B0609020204030204" pitchFamily="49" charset="0"/>
+            </a:endParaRPr>
+          </a:p>
+          <a:p>
+            <a:r>
+              <a:rPr lang="en-US" sz="2400" dirty="0">
+                <a:latin typeface="Consolas" panose="020B0609020204030204" pitchFamily="49" charset="0"/>
+              </a:rPr>
+              <a:t>$array = [</a:t>
+            </a:r>
+          </a:p>
+          <a:p>
+            <a:r>
+              <a:rPr lang="en-US" sz="2400" dirty="0">
+                <a:latin typeface="Consolas" panose="020B0609020204030204" pitchFamily="49" charset="0"/>
+              </a:rPr>
+              <a:t>    </a:t>
+            </a:r>
+            <a:r>
+              <a:rPr lang="en-US" sz="2400" dirty="0">
+                <a:solidFill>
+                  <a:srgbClr val="C00000"/>
+                </a:solidFill>
+                <a:latin typeface="Consolas" panose="020B0609020204030204" pitchFamily="49" charset="0"/>
+              </a:rPr>
+              <a:t>1</a:t>
+            </a:r>
+            <a:r>
+              <a:rPr lang="en-US" sz="2400" dirty="0">
+                <a:latin typeface="Consolas" panose="020B0609020204030204" pitchFamily="49" charset="0"/>
+              </a:rPr>
+              <a:t> =&gt; </a:t>
+            </a:r>
+            <a:r>
+              <a:rPr lang="en-US" sz="2400" dirty="0">
+                <a:solidFill>
+                  <a:schemeClr val="accent2"/>
+                </a:solidFill>
+                <a:latin typeface="Consolas" panose="020B0609020204030204" pitchFamily="49" charset="0"/>
+              </a:rPr>
+              <a:t>"foo"</a:t>
+            </a:r>
+            <a:r>
+              <a:rPr lang="en-US" sz="2400" dirty="0">
+                <a:latin typeface="Consolas" panose="020B0609020204030204" pitchFamily="49" charset="0"/>
+              </a:rPr>
+              <a:t>,</a:t>
+            </a:r>
+          </a:p>
+          <a:p>
+            <a:r>
+              <a:rPr lang="en-US" sz="2400" dirty="0">
+                <a:latin typeface="Consolas" panose="020B0609020204030204" pitchFamily="49" charset="0"/>
+              </a:rPr>
+              <a:t>    </a:t>
+            </a:r>
+            <a:r>
+              <a:rPr lang="en-US" sz="2400" dirty="0">
+                <a:solidFill>
+                  <a:srgbClr val="C00000"/>
+                </a:solidFill>
+                <a:latin typeface="Consolas" panose="020B0609020204030204" pitchFamily="49" charset="0"/>
+              </a:rPr>
+              <a:t>2</a:t>
+            </a:r>
+            <a:r>
+              <a:rPr lang="en-US" sz="2400" dirty="0">
+                <a:latin typeface="Consolas" panose="020B0609020204030204" pitchFamily="49" charset="0"/>
+              </a:rPr>
+              <a:t> =&gt; </a:t>
+            </a:r>
+            <a:r>
+              <a:rPr lang="en-US" sz="2400" dirty="0">
+                <a:solidFill>
+                  <a:schemeClr val="accent2"/>
+                </a:solidFill>
+                <a:latin typeface="Consolas" panose="020B0609020204030204" pitchFamily="49" charset="0"/>
+              </a:rPr>
+              <a:t>"bar"</a:t>
+            </a:r>
+            <a:r>
+              <a:rPr lang="en-US" sz="2400" dirty="0">
+                <a:latin typeface="Consolas" panose="020B0609020204030204" pitchFamily="49" charset="0"/>
+              </a:rPr>
+              <a:t>,</a:t>
+            </a:r>
+          </a:p>
+          <a:p>
+            <a:r>
+              <a:rPr lang="en-US" sz="2400" dirty="0">
+                <a:latin typeface="Consolas" panose="020B0609020204030204" pitchFamily="49" charset="0"/>
+              </a:rPr>
+              <a:t>];</a:t>
+            </a:r>
+          </a:p>
+          <a:p>
+            <a:endParaRPr lang="en-US" sz="2400" dirty="0">
+              <a:latin typeface="Consolas" panose="020B0609020204030204" pitchFamily="49" charset="0"/>
+            </a:endParaRPr>
+          </a:p>
+          <a:p>
+            <a:r>
+              <a:rPr lang="en-US" sz="2400" dirty="0">
+                <a:latin typeface="Consolas" panose="020B0609020204030204" pitchFamily="49" charset="0"/>
+              </a:rPr>
+              <a:t>$array[</a:t>
+            </a:r>
+            <a:r>
+              <a:rPr lang="en-US" sz="2400" dirty="0">
+                <a:solidFill>
+                  <a:srgbClr val="C00000"/>
+                </a:solidFill>
+                <a:latin typeface="Consolas" panose="020B0609020204030204" pitchFamily="49" charset="0"/>
+              </a:rPr>
+              <a:t>1</a:t>
+            </a:r>
+            <a:r>
+              <a:rPr lang="en-US" sz="2400" dirty="0">
+                <a:latin typeface="Consolas" panose="020B0609020204030204" pitchFamily="49" charset="0"/>
+              </a:rPr>
+              <a:t>] = </a:t>
+            </a:r>
+            <a:r>
+              <a:rPr lang="en-US" sz="2400" dirty="0">
+                <a:solidFill>
+                  <a:schemeClr val="accent2"/>
+                </a:solidFill>
+                <a:latin typeface="Consolas" panose="020B0609020204030204" pitchFamily="49" charset="0"/>
+              </a:rPr>
+              <a:t>"</a:t>
+            </a:r>
+            <a:r>
+              <a:rPr lang="en-US" sz="2400" dirty="0" err="1">
+                <a:solidFill>
+                  <a:schemeClr val="accent2"/>
+                </a:solidFill>
+                <a:latin typeface="Consolas" panose="020B0609020204030204" pitchFamily="49" charset="0"/>
+              </a:rPr>
+              <a:t>asdf</a:t>
+            </a:r>
+            <a:r>
+              <a:rPr lang="en-US" sz="2400" dirty="0">
+                <a:solidFill>
+                  <a:schemeClr val="accent2"/>
+                </a:solidFill>
+                <a:latin typeface="Consolas" panose="020B0609020204030204" pitchFamily="49" charset="0"/>
+              </a:rPr>
+              <a:t>"</a:t>
+            </a:r>
+            <a:r>
+              <a:rPr lang="en-US" sz="2400" dirty="0">
+                <a:latin typeface="Consolas" panose="020B0609020204030204" pitchFamily="49" charset="0"/>
+              </a:rPr>
+              <a:t>;</a:t>
+            </a:r>
+          </a:p>
+          <a:p>
+            <a:r>
+              <a:rPr lang="en-US" sz="2400" dirty="0">
+                <a:latin typeface="Consolas" panose="020B0609020204030204" pitchFamily="49" charset="0"/>
+              </a:rPr>
+              <a:t>$array[</a:t>
+            </a:r>
+            <a:r>
+              <a:rPr lang="en-US" sz="2400" dirty="0">
+                <a:solidFill>
+                  <a:srgbClr val="C00000"/>
+                </a:solidFill>
+                <a:latin typeface="Consolas" panose="020B0609020204030204" pitchFamily="49" charset="0"/>
+              </a:rPr>
+              <a:t>3</a:t>
+            </a:r>
+            <a:r>
+              <a:rPr lang="en-US" sz="2400" dirty="0">
+                <a:latin typeface="Consolas" panose="020B0609020204030204" pitchFamily="49" charset="0"/>
+              </a:rPr>
+              <a:t>] = </a:t>
+            </a:r>
+            <a:r>
+              <a:rPr lang="en-US" sz="2400" dirty="0">
+                <a:solidFill>
+                  <a:srgbClr val="C00000"/>
+                </a:solidFill>
+                <a:latin typeface="Consolas" panose="020B0609020204030204" pitchFamily="49" charset="0"/>
+              </a:rPr>
+              <a:t>10</a:t>
+            </a:r>
+            <a:r>
+              <a:rPr lang="en-US" sz="2400" dirty="0">
+                <a:latin typeface="Consolas" panose="020B0609020204030204" pitchFamily="49" charset="0"/>
+              </a:rPr>
+              <a:t>;</a:t>
+            </a:r>
+          </a:p>
+          <a:p>
+            <a:endParaRPr lang="en-US" sz="2400" dirty="0">
+              <a:latin typeface="Consolas" panose="020B0609020204030204" pitchFamily="49" charset="0"/>
+            </a:endParaRPr>
+          </a:p>
+          <a:p>
+            <a:r>
+              <a:rPr lang="en-US" sz="2400" dirty="0">
+                <a:latin typeface="Consolas" panose="020B0609020204030204" pitchFamily="49" charset="0"/>
+              </a:rPr>
+              <a:t>unset($array[</a:t>
+            </a:r>
+            <a:r>
+              <a:rPr lang="en-US" sz="2400" dirty="0">
+                <a:solidFill>
+                  <a:srgbClr val="C00000"/>
+                </a:solidFill>
+                <a:latin typeface="Consolas" panose="020B0609020204030204" pitchFamily="49" charset="0"/>
+              </a:rPr>
+              <a:t>2</a:t>
+            </a:r>
+            <a:r>
+              <a:rPr lang="en-US" sz="2400" dirty="0">
+                <a:latin typeface="Consolas" panose="020B0609020204030204" pitchFamily="49" charset="0"/>
+              </a:rPr>
+              <a:t>]);</a:t>
+            </a:r>
+          </a:p>
+          <a:p>
+            <a:endParaRPr lang="en-US" sz="2400" dirty="0">
+              <a:solidFill>
+                <a:srgbClr val="0070C0"/>
+              </a:solidFill>
+              <a:latin typeface="Consolas" panose="020B0609020204030204" pitchFamily="49" charset="0"/>
+            </a:endParaRPr>
+          </a:p>
+          <a:p>
+            <a:r>
+              <a:rPr lang="en-US" sz="2400" dirty="0" err="1">
+                <a:latin typeface="Consolas" panose="020B0609020204030204" pitchFamily="49" charset="0"/>
+              </a:rPr>
+              <a:t>var_dump</a:t>
+            </a:r>
+            <a:r>
+              <a:rPr lang="en-US" sz="2400" dirty="0">
+                <a:latin typeface="Consolas" panose="020B0609020204030204" pitchFamily="49" charset="0"/>
+              </a:rPr>
+              <a:t>($array);</a:t>
+            </a:r>
+          </a:p>
+        </p:txBody>
+      </p:sp>
+      <p:sp>
+        <p:nvSpPr>
+          <p:cNvPr id="2" name="Title 1"/>
+          <p:cNvSpPr>
+            <a:spLocks noGrp="1"/>
+          </p:cNvSpPr>
+          <p:nvPr>
+            <p:ph type="title"/>
+          </p:nvPr>
+        </p:nvSpPr>
+        <p:spPr>
+          <a:xfrm>
+            <a:off x="1" y="0"/>
+            <a:ext cx="12192000" cy="583973"/>
+          </a:xfrm>
+          <a:solidFill>
+            <a:schemeClr val="bg1">
+              <a:lumMod val="50000"/>
+            </a:schemeClr>
+          </a:solidFill>
+          <a:ln>
+            <a:noFill/>
+          </a:ln>
+        </p:spPr>
+        <p:style>
+          <a:lnRef idx="2">
+            <a:schemeClr val="accent3">
+              <a:shade val="50000"/>
+            </a:schemeClr>
+          </a:lnRef>
+          <a:fillRef idx="1">
+            <a:schemeClr val="accent3"/>
+          </a:fillRef>
+          <a:effectRef idx="0">
+            <a:schemeClr val="accent3"/>
+          </a:effectRef>
+          <a:fontRef idx="minor">
+            <a:schemeClr val="lt1"/>
+          </a:fontRef>
+        </p:style>
+        <p:txBody>
+          <a:bodyPr>
+            <a:normAutofit fontScale="90000"/>
+          </a:bodyPr>
+          <a:lstStyle/>
+          <a:p>
+            <a:pPr algn="ctr"/>
+            <a:r>
+              <a:rPr lang="en-US" sz="3600" dirty="0"/>
+              <a:t>Example 3-2 : Adding and Removing Elements</a:t>
+            </a:r>
+          </a:p>
+        </p:txBody>
+      </p:sp>
+    </p:spTree>
+    <p:extLst>
+      <p:ext uri="{BB962C8B-B14F-4D97-AF65-F5344CB8AC3E}">
+        <p14:creationId xmlns:p14="http://schemas.microsoft.com/office/powerpoint/2010/main" val="3807429974"/>
+      </p:ext>
+    </p:extLst>
+  </p:cSld>
+  <p:clrMapOvr>
+    <a:masterClrMapping/>
+  </p:clrMapOvr>
+</p:sld>
+</file>
+
+<file path=ppt/slides/slide29.xml><?xml version="1.0" encoding="utf-8"?>
+<p:sld xmlns:a="http://schemas.openxmlformats.org/drawingml/2006/main" xmlns:r="http://schemas.openxmlformats.org/officeDocument/2006/relationships" xmlns:p="http://schemas.openxmlformats.org/presentationml/2006/main">
+  <p:cSld>
+    <p:spTree>
+      <p:nvGrpSpPr>
+        <p:cNvPr id="1" name=""/>
+        <p:cNvGrpSpPr/>
+        <p:nvPr/>
+      </p:nvGrpSpPr>
+      <p:grpSpPr>
+        <a:xfrm>
+          <a:off x="0" y="0"/>
+          <a:ext cx="0" cy="0"/>
+          <a:chOff x="0" y="0"/>
+          <a:chExt cx="0" cy="0"/>
+        </a:xfrm>
+      </p:grpSpPr>
+      <p:sp>
+        <p:nvSpPr>
+          <p:cNvPr id="2" name="Title 1"/>
+          <p:cNvSpPr>
+            <a:spLocks noGrp="1"/>
+          </p:cNvSpPr>
+          <p:nvPr>
+            <p:ph type="title"/>
+          </p:nvPr>
+        </p:nvSpPr>
+        <p:spPr/>
+        <p:txBody>
+          <a:bodyPr/>
+          <a:lstStyle/>
+          <a:p>
+            <a:r>
+              <a:rPr lang="en-US" dirty="0"/>
+              <a:t>Numeric Indexes</a:t>
+            </a:r>
+          </a:p>
+        </p:txBody>
+      </p:sp>
+      <p:sp>
+        <p:nvSpPr>
+          <p:cNvPr id="3" name="Content Placeholder 2"/>
+          <p:cNvSpPr>
+            <a:spLocks noGrp="1"/>
+          </p:cNvSpPr>
+          <p:nvPr>
+            <p:ph idx="1"/>
+          </p:nvPr>
+        </p:nvSpPr>
+        <p:spPr/>
+        <p:txBody>
+          <a:bodyPr/>
+          <a:lstStyle/>
+          <a:p>
+            <a:r>
+              <a:rPr lang="en-US" dirty="0"/>
+              <a:t>PHP can automatically assign </a:t>
+            </a:r>
+            <a:r>
+              <a:rPr lang="en-US" b="1" dirty="0"/>
+              <a:t>numeric indexes </a:t>
+            </a:r>
+            <a:r>
+              <a:rPr lang="en-US" dirty="0"/>
+              <a:t>(integer keys)</a:t>
+            </a:r>
+            <a:endParaRPr lang="en-US" b="1" dirty="0"/>
+          </a:p>
+          <a:p>
+            <a:r>
+              <a:rPr lang="en-US" dirty="0"/>
+              <a:t>Arrays created without keys will be given numeric indexes</a:t>
+            </a:r>
+          </a:p>
+          <a:p>
+            <a:r>
+              <a:rPr lang="en-US" dirty="0"/>
+              <a:t>New elements can be given numeric indexes using empty brackets</a:t>
+            </a:r>
+          </a:p>
+        </p:txBody>
+      </p:sp>
+    </p:spTree>
+    <p:extLst>
+      <p:ext uri="{BB962C8B-B14F-4D97-AF65-F5344CB8AC3E}">
+        <p14:creationId xmlns:p14="http://schemas.microsoft.com/office/powerpoint/2010/main" val="633555496"/>
       </p:ext>
     </p:extLst>
   </p:cSld>
@@ -5225,7 +9056,7 @@
           <a:p>
             <a:r>
               <a:rPr lang="en-US" dirty="0"/>
-              <a:t>Code is written instructions for computers</a:t>
+              <a:t>Code – written instructions for computers</a:t>
             </a:r>
           </a:p>
           <a:p>
@@ -5236,18 +9067,18 @@
           </a:p>
           <a:p>
             <a:r>
-              <a:rPr lang="en-US"/>
-              <a:t>PHP</a:t>
-            </a:r>
-            <a:r>
-              <a:rPr lang="en-US" dirty="0"/>
-              <a:t> is a programming language</a:t>
-            </a:r>
-          </a:p>
-          <a:p>
-            <a:r>
-              <a:rPr lang="en-US" dirty="0"/>
-              <a:t>Programming languages are readable by humans and machines</a:t>
+              <a:rPr lang="en-US" dirty="0"/>
+              <a:t>PHP is a programming language</a:t>
+            </a:r>
+          </a:p>
+          <a:p>
+            <a:r>
+              <a:rPr lang="en-US" b="1" dirty="0"/>
+              <a:t>Programming languages</a:t>
+            </a:r>
+            <a:r>
+              <a:rPr lang="en-US" dirty="0"/>
+              <a:t> are readable by humans and machines</a:t>
             </a:r>
           </a:p>
           <a:p>
@@ -5262,6 +9093,513 @@
     <p:extLst>
       <p:ext uri="{BB962C8B-B14F-4D97-AF65-F5344CB8AC3E}">
         <p14:creationId xmlns:p14="http://schemas.microsoft.com/office/powerpoint/2010/main" val="397912412"/>
+      </p:ext>
+    </p:extLst>
+  </p:cSld>
+  <p:clrMapOvr>
+    <a:masterClrMapping/>
+  </p:clrMapOvr>
+</p:sld>
+</file>
+
+<file path=ppt/slides/slide30.xml><?xml version="1.0" encoding="utf-8"?>
+<p:sld xmlns:a="http://schemas.openxmlformats.org/drawingml/2006/main" xmlns:r="http://schemas.openxmlformats.org/officeDocument/2006/relationships" xmlns:p="http://schemas.openxmlformats.org/presentationml/2006/main">
+  <p:cSld>
+    <p:spTree>
+      <p:nvGrpSpPr>
+        <p:cNvPr id="1" name=""/>
+        <p:cNvGrpSpPr/>
+        <p:nvPr/>
+      </p:nvGrpSpPr>
+      <p:grpSpPr>
+        <a:xfrm>
+          <a:off x="0" y="0"/>
+          <a:ext cx="0" cy="0"/>
+          <a:chOff x="0" y="0"/>
+          <a:chExt cx="0" cy="0"/>
+        </a:xfrm>
+      </p:grpSpPr>
+      <p:sp>
+        <p:nvSpPr>
+          <p:cNvPr id="5" name="TextBox 4"/>
+          <p:cNvSpPr txBox="1"/>
+          <p:nvPr/>
+        </p:nvSpPr>
+        <p:spPr>
+          <a:xfrm>
+            <a:off x="0" y="583973"/>
+            <a:ext cx="935489" cy="6370975"/>
+          </a:xfrm>
+          <a:prstGeom prst="rect">
+            <a:avLst/>
+          </a:prstGeom>
+          <a:solidFill>
+            <a:schemeClr val="bg1">
+              <a:lumMod val="85000"/>
+            </a:schemeClr>
+          </a:solidFill>
+        </p:spPr>
+        <p:txBody>
+          <a:bodyPr wrap="square" rtlCol="0" anchor="ctr">
+            <a:spAutoFit/>
+          </a:bodyPr>
+          <a:lstStyle/>
+          <a:p>
+            <a:pPr algn="r"/>
+            <a:r>
+              <a:rPr lang="en-US" sz="2400" dirty="0">
+                <a:solidFill>
+                  <a:schemeClr val="accent3">
+                    <a:lumMod val="50000"/>
+                  </a:schemeClr>
+                </a:solidFill>
+                <a:latin typeface="Consolas" panose="020B0609020204030204" pitchFamily="49" charset="0"/>
+              </a:rPr>
+              <a:t>1</a:t>
+            </a:r>
+          </a:p>
+          <a:p>
+            <a:pPr algn="r"/>
+            <a:r>
+              <a:rPr lang="en-US" sz="2400" dirty="0">
+                <a:solidFill>
+                  <a:schemeClr val="accent3">
+                    <a:lumMod val="50000"/>
+                  </a:schemeClr>
+                </a:solidFill>
+                <a:latin typeface="Consolas" panose="020B0609020204030204" pitchFamily="49" charset="0"/>
+              </a:rPr>
+              <a:t>2</a:t>
+            </a:r>
+          </a:p>
+          <a:p>
+            <a:pPr algn="r"/>
+            <a:r>
+              <a:rPr lang="en-US" sz="2400" dirty="0">
+                <a:solidFill>
+                  <a:schemeClr val="accent3">
+                    <a:lumMod val="50000"/>
+                  </a:schemeClr>
+                </a:solidFill>
+                <a:latin typeface="Consolas" panose="020B0609020204030204" pitchFamily="49" charset="0"/>
+              </a:rPr>
+              <a:t>3</a:t>
+            </a:r>
+          </a:p>
+          <a:p>
+            <a:pPr algn="r"/>
+            <a:r>
+              <a:rPr lang="en-US" sz="2400" dirty="0">
+                <a:solidFill>
+                  <a:schemeClr val="accent3">
+                    <a:lumMod val="50000"/>
+                  </a:schemeClr>
+                </a:solidFill>
+                <a:latin typeface="Consolas" panose="020B0609020204030204" pitchFamily="49" charset="0"/>
+              </a:rPr>
+              <a:t>4</a:t>
+            </a:r>
+          </a:p>
+          <a:p>
+            <a:pPr algn="r"/>
+            <a:r>
+              <a:rPr lang="en-US" sz="2400" dirty="0">
+                <a:solidFill>
+                  <a:schemeClr val="accent3">
+                    <a:lumMod val="50000"/>
+                  </a:schemeClr>
+                </a:solidFill>
+                <a:latin typeface="Consolas" panose="020B0609020204030204" pitchFamily="49" charset="0"/>
+              </a:rPr>
+              <a:t>5</a:t>
+            </a:r>
+          </a:p>
+          <a:p>
+            <a:pPr algn="r"/>
+            <a:r>
+              <a:rPr lang="en-US" sz="2400" dirty="0">
+                <a:solidFill>
+                  <a:schemeClr val="accent3">
+                    <a:lumMod val="50000"/>
+                  </a:schemeClr>
+                </a:solidFill>
+                <a:latin typeface="Consolas" panose="020B0609020204030204" pitchFamily="49" charset="0"/>
+              </a:rPr>
+              <a:t>6</a:t>
+            </a:r>
+          </a:p>
+          <a:p>
+            <a:pPr algn="r"/>
+            <a:r>
+              <a:rPr lang="en-US" sz="2400" dirty="0">
+                <a:solidFill>
+                  <a:schemeClr val="accent3">
+                    <a:lumMod val="50000"/>
+                  </a:schemeClr>
+                </a:solidFill>
+                <a:latin typeface="Consolas" panose="020B0609020204030204" pitchFamily="49" charset="0"/>
+              </a:rPr>
+              <a:t>7</a:t>
+            </a:r>
+          </a:p>
+          <a:p>
+            <a:pPr algn="r"/>
+            <a:r>
+              <a:rPr lang="en-US" sz="2400" dirty="0">
+                <a:solidFill>
+                  <a:schemeClr val="accent3">
+                    <a:lumMod val="50000"/>
+                  </a:schemeClr>
+                </a:solidFill>
+                <a:latin typeface="Consolas" panose="020B0609020204030204" pitchFamily="49" charset="0"/>
+              </a:rPr>
+              <a:t>8</a:t>
+            </a:r>
+          </a:p>
+          <a:p>
+            <a:pPr algn="r"/>
+            <a:r>
+              <a:rPr lang="en-US" sz="2400" dirty="0">
+                <a:solidFill>
+                  <a:schemeClr val="accent3">
+                    <a:lumMod val="50000"/>
+                  </a:schemeClr>
+                </a:solidFill>
+                <a:latin typeface="Consolas" panose="020B0609020204030204" pitchFamily="49" charset="0"/>
+              </a:rPr>
+              <a:t>9</a:t>
+            </a:r>
+          </a:p>
+          <a:p>
+            <a:pPr algn="r"/>
+            <a:r>
+              <a:rPr lang="en-US" sz="2400" dirty="0">
+                <a:solidFill>
+                  <a:schemeClr val="accent3">
+                    <a:lumMod val="50000"/>
+                  </a:schemeClr>
+                </a:solidFill>
+                <a:latin typeface="Consolas" panose="020B0609020204030204" pitchFamily="49" charset="0"/>
+              </a:rPr>
+              <a:t>10</a:t>
+            </a:r>
+          </a:p>
+          <a:p>
+            <a:pPr algn="r"/>
+            <a:r>
+              <a:rPr lang="en-US" sz="2400" dirty="0">
+                <a:solidFill>
+                  <a:schemeClr val="accent3">
+                    <a:lumMod val="50000"/>
+                  </a:schemeClr>
+                </a:solidFill>
+                <a:latin typeface="Consolas" panose="020B0609020204030204" pitchFamily="49" charset="0"/>
+              </a:rPr>
+              <a:t>11</a:t>
+            </a:r>
+          </a:p>
+          <a:p>
+            <a:pPr algn="r"/>
+            <a:r>
+              <a:rPr lang="en-US" sz="2400" dirty="0">
+                <a:solidFill>
+                  <a:schemeClr val="accent3">
+                    <a:lumMod val="50000"/>
+                  </a:schemeClr>
+                </a:solidFill>
+                <a:latin typeface="Consolas" panose="020B0609020204030204" pitchFamily="49" charset="0"/>
+              </a:rPr>
+              <a:t>12</a:t>
+            </a:r>
+          </a:p>
+          <a:p>
+            <a:pPr algn="r"/>
+            <a:r>
+              <a:rPr lang="en-US" sz="2400" dirty="0">
+                <a:solidFill>
+                  <a:schemeClr val="accent3">
+                    <a:lumMod val="50000"/>
+                  </a:schemeClr>
+                </a:solidFill>
+                <a:latin typeface="Consolas" panose="020B0609020204030204" pitchFamily="49" charset="0"/>
+              </a:rPr>
+              <a:t>13</a:t>
+            </a:r>
+          </a:p>
+          <a:p>
+            <a:pPr algn="r"/>
+            <a:r>
+              <a:rPr lang="en-US" sz="2400" dirty="0">
+                <a:solidFill>
+                  <a:schemeClr val="accent3">
+                    <a:lumMod val="50000"/>
+                  </a:schemeClr>
+                </a:solidFill>
+                <a:latin typeface="Consolas" panose="020B0609020204030204" pitchFamily="49" charset="0"/>
+              </a:rPr>
+              <a:t>14</a:t>
+            </a:r>
+          </a:p>
+          <a:p>
+            <a:pPr algn="r"/>
+            <a:r>
+              <a:rPr lang="en-US" sz="2400" dirty="0">
+                <a:solidFill>
+                  <a:schemeClr val="accent3">
+                    <a:lumMod val="50000"/>
+                  </a:schemeClr>
+                </a:solidFill>
+                <a:latin typeface="Consolas" panose="020B0609020204030204" pitchFamily="49" charset="0"/>
+              </a:rPr>
+              <a:t>15</a:t>
+            </a:r>
+          </a:p>
+          <a:p>
+            <a:pPr algn="r"/>
+            <a:r>
+              <a:rPr lang="en-US" sz="2400" dirty="0">
+                <a:solidFill>
+                  <a:schemeClr val="accent3">
+                    <a:lumMod val="50000"/>
+                  </a:schemeClr>
+                </a:solidFill>
+                <a:latin typeface="Consolas" panose="020B0609020204030204" pitchFamily="49" charset="0"/>
+              </a:rPr>
+              <a:t>16</a:t>
+            </a:r>
+          </a:p>
+          <a:p>
+            <a:pPr algn="r"/>
+            <a:endParaRPr lang="en-US" sz="2400" dirty="0">
+              <a:latin typeface="Consolas" panose="020B0609020204030204" pitchFamily="49" charset="0"/>
+            </a:endParaRPr>
+          </a:p>
+        </p:txBody>
+      </p:sp>
+      <p:sp>
+        <p:nvSpPr>
+          <p:cNvPr id="6" name="TextBox 5"/>
+          <p:cNvSpPr txBox="1"/>
+          <p:nvPr/>
+        </p:nvSpPr>
+        <p:spPr>
+          <a:xfrm>
+            <a:off x="935490" y="583973"/>
+            <a:ext cx="11256511" cy="3785652"/>
+          </a:xfrm>
+          <a:prstGeom prst="rect">
+            <a:avLst/>
+          </a:prstGeom>
+          <a:noFill/>
+        </p:spPr>
+        <p:txBody>
+          <a:bodyPr wrap="square" rtlCol="0">
+            <a:spAutoFit/>
+          </a:bodyPr>
+          <a:lstStyle/>
+          <a:p>
+            <a:pPr marL="0" indent="0">
+              <a:buNone/>
+            </a:pPr>
+            <a:r>
+              <a:rPr lang="en-US" sz="2400" dirty="0">
+                <a:solidFill>
+                  <a:srgbClr val="7030A0"/>
+                </a:solidFill>
+                <a:latin typeface="Consolas" panose="020B0609020204030204" pitchFamily="49" charset="0"/>
+              </a:rPr>
+              <a:t>&lt;?php</a:t>
+            </a:r>
+            <a:endParaRPr lang="en-US" sz="2400" dirty="0">
+              <a:latin typeface="Consolas" panose="020B0609020204030204" pitchFamily="49" charset="0"/>
+            </a:endParaRPr>
+          </a:p>
+          <a:p>
+            <a:pPr marL="0" indent="0">
+              <a:buNone/>
+            </a:pPr>
+            <a:endParaRPr lang="en-US" sz="2400" dirty="0">
+              <a:latin typeface="Consolas" panose="020B0609020204030204" pitchFamily="49" charset="0"/>
+            </a:endParaRPr>
+          </a:p>
+          <a:p>
+            <a:r>
+              <a:rPr lang="en-US" sz="2400" dirty="0">
+                <a:latin typeface="Consolas" panose="020B0609020204030204" pitchFamily="49" charset="0"/>
+              </a:rPr>
+              <a:t>$array = [</a:t>
+            </a:r>
+          </a:p>
+          <a:p>
+            <a:r>
+              <a:rPr lang="en-US" sz="2400" dirty="0">
+                <a:solidFill>
+                  <a:schemeClr val="accent2"/>
+                </a:solidFill>
+                <a:latin typeface="Consolas" panose="020B0609020204030204" pitchFamily="49" charset="0"/>
+              </a:rPr>
+              <a:t>    "foo"</a:t>
+            </a:r>
+            <a:r>
+              <a:rPr lang="en-US" sz="2400" dirty="0">
+                <a:latin typeface="Consolas" panose="020B0609020204030204" pitchFamily="49" charset="0"/>
+              </a:rPr>
+              <a:t>,</a:t>
+            </a:r>
+          </a:p>
+          <a:p>
+            <a:r>
+              <a:rPr lang="en-US" sz="2400" dirty="0">
+                <a:solidFill>
+                  <a:schemeClr val="accent2"/>
+                </a:solidFill>
+                <a:latin typeface="Consolas" panose="020B0609020204030204" pitchFamily="49" charset="0"/>
+              </a:rPr>
+              <a:t>    "bar"</a:t>
+            </a:r>
+            <a:r>
+              <a:rPr lang="en-US" sz="2400" dirty="0">
+                <a:latin typeface="Consolas" panose="020B0609020204030204" pitchFamily="49" charset="0"/>
+              </a:rPr>
+              <a:t>,</a:t>
+            </a:r>
+          </a:p>
+          <a:p>
+            <a:r>
+              <a:rPr lang="en-US" sz="2400" dirty="0">
+                <a:latin typeface="Consolas" panose="020B0609020204030204" pitchFamily="49" charset="0"/>
+              </a:rPr>
+              <a:t>];</a:t>
+            </a:r>
+          </a:p>
+          <a:p>
+            <a:endParaRPr lang="en-US" sz="2400" dirty="0">
+              <a:latin typeface="Consolas" panose="020B0609020204030204" pitchFamily="49" charset="0"/>
+            </a:endParaRPr>
+          </a:p>
+          <a:p>
+            <a:r>
+              <a:rPr lang="en-US" sz="2400" dirty="0">
+                <a:latin typeface="Consolas" panose="020B0609020204030204" pitchFamily="49" charset="0"/>
+              </a:rPr>
+              <a:t>$array[] = </a:t>
+            </a:r>
+            <a:r>
+              <a:rPr lang="en-US" sz="2400" dirty="0">
+                <a:solidFill>
+                  <a:schemeClr val="accent2"/>
+                </a:solidFill>
+                <a:latin typeface="Consolas" panose="020B0609020204030204" pitchFamily="49" charset="0"/>
+              </a:rPr>
+              <a:t>"</a:t>
+            </a:r>
+            <a:r>
+              <a:rPr lang="en-US" sz="2400" dirty="0" err="1">
+                <a:solidFill>
+                  <a:schemeClr val="accent2"/>
+                </a:solidFill>
+                <a:latin typeface="Consolas" panose="020B0609020204030204" pitchFamily="49" charset="0"/>
+              </a:rPr>
+              <a:t>asdf</a:t>
+            </a:r>
+            <a:r>
+              <a:rPr lang="en-US" sz="2400" dirty="0">
+                <a:solidFill>
+                  <a:schemeClr val="accent2"/>
+                </a:solidFill>
+                <a:latin typeface="Consolas" panose="020B0609020204030204" pitchFamily="49" charset="0"/>
+              </a:rPr>
+              <a:t>"</a:t>
+            </a:r>
+            <a:r>
+              <a:rPr lang="en-US" sz="2400" dirty="0">
+                <a:latin typeface="Consolas" panose="020B0609020204030204" pitchFamily="49" charset="0"/>
+              </a:rPr>
+              <a:t>;</a:t>
+            </a:r>
+          </a:p>
+          <a:p>
+            <a:endParaRPr lang="en-US" sz="2400" dirty="0">
+              <a:solidFill>
+                <a:srgbClr val="0070C0"/>
+              </a:solidFill>
+              <a:latin typeface="Consolas" panose="020B0609020204030204" pitchFamily="49" charset="0"/>
+            </a:endParaRPr>
+          </a:p>
+          <a:p>
+            <a:r>
+              <a:rPr lang="en-US" sz="2400" dirty="0" err="1">
+                <a:latin typeface="Consolas" panose="020B0609020204030204" pitchFamily="49" charset="0"/>
+              </a:rPr>
+              <a:t>var_dump</a:t>
+            </a:r>
+            <a:r>
+              <a:rPr lang="en-US" sz="2400" dirty="0">
+                <a:latin typeface="Consolas" panose="020B0609020204030204" pitchFamily="49" charset="0"/>
+              </a:rPr>
+              <a:t>($array);</a:t>
+            </a:r>
+          </a:p>
+        </p:txBody>
+      </p:sp>
+      <p:sp>
+        <p:nvSpPr>
+          <p:cNvPr id="2" name="Title 1"/>
+          <p:cNvSpPr>
+            <a:spLocks noGrp="1"/>
+          </p:cNvSpPr>
+          <p:nvPr>
+            <p:ph type="title"/>
+          </p:nvPr>
+        </p:nvSpPr>
+        <p:spPr>
+          <a:xfrm>
+            <a:off x="1" y="0"/>
+            <a:ext cx="12192000" cy="583973"/>
+          </a:xfrm>
+          <a:solidFill>
+            <a:schemeClr val="bg1">
+              <a:lumMod val="50000"/>
+            </a:schemeClr>
+          </a:solidFill>
+          <a:ln>
+            <a:noFill/>
+          </a:ln>
+        </p:spPr>
+        <p:style>
+          <a:lnRef idx="2">
+            <a:schemeClr val="accent3">
+              <a:shade val="50000"/>
+            </a:schemeClr>
+          </a:lnRef>
+          <a:fillRef idx="1">
+            <a:schemeClr val="accent3"/>
+          </a:fillRef>
+          <a:effectRef idx="0">
+            <a:schemeClr val="accent3"/>
+          </a:effectRef>
+          <a:fontRef idx="minor">
+            <a:schemeClr val="lt1"/>
+          </a:fontRef>
+        </p:style>
+        <p:txBody>
+          <a:bodyPr>
+            <a:normAutofit fontScale="90000"/>
+          </a:bodyPr>
+          <a:lstStyle/>
+          <a:p>
+            <a:pPr algn="ctr"/>
+            <a:r>
+              <a:rPr lang="en-US" sz="3600" dirty="0"/>
+              <a:t>Example 3-3 : Numeric Indexes</a:t>
+            </a:r>
+          </a:p>
+        </p:txBody>
+      </p:sp>
+    </p:spTree>
+    <p:extLst>
+      <p:ext uri="{BB962C8B-B14F-4D97-AF65-F5344CB8AC3E}">
+        <p14:creationId xmlns:p14="http://schemas.microsoft.com/office/powerpoint/2010/main" val="1897348559"/>
       </p:ext>
     </p:extLst>
   </p:cSld>
@@ -5327,33 +9665,34 @@
           <a:p>
             <a:r>
               <a:rPr lang="en-US" dirty="0"/>
-              <a:t>Code is a list of instructions</a:t>
-            </a:r>
-          </a:p>
-          <a:p>
-            <a:r>
-              <a:rPr lang="en-US" dirty="0"/>
-              <a:t>Each instruction tells the computer to do something</a:t>
-            </a:r>
-          </a:p>
-          <a:p>
-            <a:r>
-              <a:rPr lang="en-US" dirty="0"/>
-              <a:t>Instructions are followed in order</a:t>
-            </a:r>
-          </a:p>
-          <a:p>
-            <a:r>
-              <a:rPr lang="en-US" dirty="0"/>
-              <a:t>In </a:t>
-            </a:r>
-            <a:r>
-              <a:rPr lang="en-US"/>
-              <a:t>PHP</a:t>
-            </a:r>
-            <a:r>
-              <a:rPr lang="en-US" dirty="0"/>
-              <a:t>, instructions end with a semicolon (;)</a:t>
+              <a:t>Code is a list of </a:t>
+            </a:r>
+            <a:r>
+              <a:rPr lang="en-US" b="1" dirty="0"/>
+              <a:t>statements </a:t>
+            </a:r>
+            <a:r>
+              <a:rPr lang="en-US" dirty="0"/>
+              <a:t>(instructions for the computer)</a:t>
+            </a:r>
+            <a:endParaRPr lang="en-US" b="1" dirty="0"/>
+          </a:p>
+          <a:p>
+            <a:r>
+              <a:rPr lang="en-US" dirty="0"/>
+              <a:t>Each statement tells the computer to do something</a:t>
+            </a:r>
+          </a:p>
+          <a:p>
+            <a:r>
+              <a:rPr lang="en-US" dirty="0"/>
+              <a:t>Statements are followed in order</a:t>
+            </a:r>
+          </a:p>
+          <a:p>
+            <a:r>
+              <a:rPr lang="en-US" dirty="0"/>
+              <a:t>In PHP, statements end with a semicolon (;)</a:t>
             </a:r>
           </a:p>
         </p:txBody>
@@ -5971,18 +10310,18 @@
           </a:p>
           <a:p>
             <a:r>
-              <a:rPr lang="en-US" dirty="0"/>
-              <a:t>Type is determined by the data</a:t>
-            </a:r>
-          </a:p>
-          <a:p>
-            <a:r>
-              <a:rPr lang="en-US"/>
-              <a:t>PHP</a:t>
-            </a:r>
-            <a:r>
-              <a:rPr lang="en-US" dirty="0"/>
-              <a:t> can and will change the type if necessary</a:t>
+              <a:rPr lang="en-US" b="1" dirty="0"/>
+              <a:t>Type</a:t>
+            </a:r>
+            <a:r>
+              <a:rPr lang="en-US" dirty="0"/>
+              <a:t> is determined by the data</a:t>
+            </a:r>
+          </a:p>
+          <a:p>
+            <a:r>
+              <a:rPr lang="en-US" dirty="0"/>
+              <a:t>PHP can and will change the type if necessary</a:t>
             </a:r>
           </a:p>
           <a:p>
@@ -5994,8 +10333,12 @@
           <a:p>
             <a:pPr lvl="1"/>
             <a:r>
-              <a:rPr lang="en-US" dirty="0"/>
-              <a:t>String – Text, enclosed with </a:t>
+              <a:rPr lang="en-US" b="1" dirty="0"/>
+              <a:t>String</a:t>
+            </a:r>
+            <a:r>
+              <a:rPr lang="en-US" dirty="0"/>
+              <a:t> – Text, enclosed with </a:t>
             </a:r>
             <a:r>
               <a:rPr lang="en-US" sz="2400" dirty="0">
@@ -6017,22 +10360,34 @@
           <a:p>
             <a:pPr lvl="1"/>
             <a:r>
-              <a:rPr lang="en-US" dirty="0"/>
-              <a:t>Integer – Number without a decimal, can be positive or negative</a:t>
+              <a:rPr lang="en-US" b="1" dirty="0"/>
+              <a:t>Integer</a:t>
+            </a:r>
+            <a:r>
+              <a:rPr lang="en-US" dirty="0"/>
+              <a:t> – Number without a decimal, can be positive or negative</a:t>
             </a:r>
           </a:p>
           <a:p>
             <a:pPr lvl="1"/>
             <a:r>
-              <a:rPr lang="en-US" dirty="0"/>
-              <a:t>Float – Like integer, but with a decimal point (sort of)</a:t>
+              <a:rPr lang="en-US" b="1" dirty="0"/>
+              <a:t>Float</a:t>
+            </a:r>
+            <a:r>
+              <a:rPr lang="en-US" dirty="0"/>
+              <a:t> – Like integer, but with a decimal point (sort of)</a:t>
             </a:r>
           </a:p>
           <a:p>
             <a:pPr lvl="1"/>
             <a:r>
-              <a:rPr lang="en-US" dirty="0"/>
-              <a:t>Boolean – </a:t>
+              <a:rPr lang="en-US" b="1" dirty="0"/>
+              <a:t>Boolean</a:t>
+            </a:r>
+            <a:r>
+              <a:rPr lang="en-US" dirty="0"/>
+              <a:t> – </a:t>
             </a:r>
             <a:r>
               <a:rPr lang="en-US" sz="2200" dirty="0">
@@ -6064,8 +10419,12 @@
           <a:p>
             <a:pPr lvl="1"/>
             <a:r>
-              <a:rPr lang="en-US" dirty="0"/>
-              <a:t>Null – Doesn’t really exist, indicates lack of a value</a:t>
+              <a:rPr lang="en-US" b="1" dirty="0"/>
+              <a:t>Null</a:t>
+            </a:r>
+            <a:r>
+              <a:rPr lang="en-US" dirty="0"/>
+              <a:t> – Doesn’t really exist, indicates lack of a value</a:t>
             </a:r>
           </a:p>
         </p:txBody>
@@ -6138,8 +10497,12 @@
           <a:lstStyle/>
           <a:p>
             <a:r>
-              <a:rPr lang="en-US" dirty="0"/>
-              <a:t>Named containers for storing data</a:t>
+              <a:rPr lang="en-US" b="1" dirty="0"/>
+              <a:t>Variable</a:t>
+            </a:r>
+            <a:r>
+              <a:rPr lang="en-US" dirty="0"/>
+              <a:t> - Named container for storing data</a:t>
             </a:r>
           </a:p>
           <a:p>
@@ -6156,8 +10519,12 @@
           </a:p>
           <a:p>
             <a:r>
-              <a:rPr lang="en-US" dirty="0"/>
-              <a:t>Assign a value to a variable (read: put something in it) with =</a:t>
+              <a:rPr lang="en-US" b="1" dirty="0"/>
+              <a:t>Assign</a:t>
+            </a:r>
+            <a:r>
+              <a:rPr lang="en-US" dirty="0"/>
+              <a:t> a value to a variable (put something in it) with =</a:t>
             </a:r>
           </a:p>
           <a:p>

</xml_diff>